<commit_message>
fix ppt branch slide
</commit_message>
<xml_diff>
--- a/doc/rvc_asap.pptx
+++ b/doc/rvc_asap.pptx
@@ -150,14 +150,6 @@
 </p:presentation>
 </file>
 
-<file path=ppt/revisionInfo.xml><?xml version="1.0" encoding="utf-8"?>
-<p1510:revInfo xmlns:a="http://schemas.openxmlformats.org/drawingml/2006/main" xmlns:r="http://schemas.openxmlformats.org/officeDocument/2006/relationships" xmlns:p1510="http://schemas.microsoft.com/office/powerpoint/2015/10/main">
-  <p1510:revLst>
-    <p1510:client id="{0A9FCC0F-97AF-4C53-9B3C-A197022201F1}" v="447" dt="2021-11-04T14:48:10.318"/>
-  </p1510:revLst>
-</p1510:revInfo>
-</file>
-
 <file path=ppt/changesInfos/changesInfo1.xml><?xml version="1.0" encoding="utf-8"?>
 <pc:chgInfo xmlns:a="http://schemas.openxmlformats.org/drawingml/2006/main" xmlns:r="http://schemas.openxmlformats.org/officeDocument/2006/relationships" xmlns:ac="http://schemas.microsoft.com/office/drawing/2013/main/command" xmlns:pc="http://schemas.microsoft.com/office/powerpoint/2013/main/command">
   <pc:docChgLst>
@@ -2557,6 +2549,77 @@
           <pc:docMk/>
           <pc:sldMk cId="4267747427" sldId="296"/>
         </pc:sldMkLst>
+      </pc:sldChg>
+    </pc:docChg>
+  </pc:docChgLst>
+  <pc:docChgLst>
+    <pc:chgData name="Ben David, Amichai" userId="61db3613-8e7d-462d-ad89-c92cdcbd783e" providerId="ADAL" clId="{3D5BDBF9-29F2-4F54-B160-DAC3CCFBD5D0}"/>
+    <pc:docChg chg="undo custSel modSld">
+      <pc:chgData name="Ben David, Amichai" userId="61db3613-8e7d-462d-ad89-c92cdcbd783e" providerId="ADAL" clId="{3D5BDBF9-29F2-4F54-B160-DAC3CCFBD5D0}" dt="2021-12-14T14:49:08.066" v="19" actId="1036"/>
+      <pc:docMkLst>
+        <pc:docMk/>
+      </pc:docMkLst>
+      <pc:sldChg chg="addSp delSp modSp mod">
+        <pc:chgData name="Ben David, Amichai" userId="61db3613-8e7d-462d-ad89-c92cdcbd783e" providerId="ADAL" clId="{3D5BDBF9-29F2-4F54-B160-DAC3CCFBD5D0}" dt="2021-12-14T14:49:03.503" v="18" actId="1035"/>
+        <pc:sldMkLst>
+          <pc:docMk/>
+          <pc:sldMk cId="3695897507" sldId="267"/>
+        </pc:sldMkLst>
+        <pc:spChg chg="add del mod">
+          <ac:chgData name="Ben David, Amichai" userId="61db3613-8e7d-462d-ad89-c92cdcbd783e" providerId="ADAL" clId="{3D5BDBF9-29F2-4F54-B160-DAC3CCFBD5D0}" dt="2021-12-14T14:48:27.497" v="5" actId="22"/>
+          <ac:spMkLst>
+            <pc:docMk/>
+            <pc:sldMk cId="3695897507" sldId="267"/>
+            <ac:spMk id="4" creationId="{55A05C77-85C7-4890-B8B0-71F046C7206E}"/>
+          </ac:spMkLst>
+        </pc:spChg>
+        <pc:picChg chg="del">
+          <ac:chgData name="Ben David, Amichai" userId="61db3613-8e7d-462d-ad89-c92cdcbd783e" providerId="ADAL" clId="{3D5BDBF9-29F2-4F54-B160-DAC3CCFBD5D0}" dt="2021-12-14T14:48:16.509" v="0" actId="478"/>
+          <ac:picMkLst>
+            <pc:docMk/>
+            <pc:sldMk cId="3695897507" sldId="267"/>
+            <ac:picMk id="8" creationId="{70815CBA-FA3B-434D-AD7D-204F7E89714C}"/>
+          </ac:picMkLst>
+        </pc:picChg>
+        <pc:picChg chg="add del">
+          <ac:chgData name="Ben David, Amichai" userId="61db3613-8e7d-462d-ad89-c92cdcbd783e" providerId="ADAL" clId="{3D5BDBF9-29F2-4F54-B160-DAC3CCFBD5D0}" dt="2021-12-14T14:48:17.816" v="2" actId="22"/>
+          <ac:picMkLst>
+            <pc:docMk/>
+            <pc:sldMk cId="3695897507" sldId="267"/>
+            <ac:picMk id="9" creationId="{BD6AAB0E-74D0-4665-A0A8-55873B3689D7}"/>
+          </ac:picMkLst>
+        </pc:picChg>
+        <pc:picChg chg="add del mod ord">
+          <ac:chgData name="Ben David, Amichai" userId="61db3613-8e7d-462d-ad89-c92cdcbd783e" providerId="ADAL" clId="{3D5BDBF9-29F2-4F54-B160-DAC3CCFBD5D0}" dt="2021-12-14T14:48:20.316" v="4" actId="22"/>
+          <ac:picMkLst>
+            <pc:docMk/>
+            <pc:sldMk cId="3695897507" sldId="267"/>
+            <ac:picMk id="11" creationId="{952F9467-A45A-4A06-B9D8-1A009F71F66D}"/>
+          </ac:picMkLst>
+        </pc:picChg>
+        <pc:picChg chg="add mod ord">
+          <ac:chgData name="Ben David, Amichai" userId="61db3613-8e7d-462d-ad89-c92cdcbd783e" providerId="ADAL" clId="{3D5BDBF9-29F2-4F54-B160-DAC3CCFBD5D0}" dt="2021-12-14T14:49:03.503" v="18" actId="1035"/>
+          <ac:picMkLst>
+            <pc:docMk/>
+            <pc:sldMk cId="3695897507" sldId="267"/>
+            <ac:picMk id="13" creationId="{5B6AAFD8-69FD-491F-BFA7-F0ED6C66654D}"/>
+          </ac:picMkLst>
+        </pc:picChg>
+      </pc:sldChg>
+      <pc:sldChg chg="modSp mod">
+        <pc:chgData name="Ben David, Amichai" userId="61db3613-8e7d-462d-ad89-c92cdcbd783e" providerId="ADAL" clId="{3D5BDBF9-29F2-4F54-B160-DAC3CCFBD5D0}" dt="2021-12-14T14:49:08.066" v="19" actId="1036"/>
+        <pc:sldMkLst>
+          <pc:docMk/>
+          <pc:sldMk cId="1294981329" sldId="269"/>
+        </pc:sldMkLst>
+        <pc:picChg chg="mod">
+          <ac:chgData name="Ben David, Amichai" userId="61db3613-8e7d-462d-ad89-c92cdcbd783e" providerId="ADAL" clId="{3D5BDBF9-29F2-4F54-B160-DAC3CCFBD5D0}" dt="2021-12-14T14:49:08.066" v="19" actId="1036"/>
+          <ac:picMkLst>
+            <pc:docMk/>
+            <pc:sldMk cId="1294981329" sldId="269"/>
+            <ac:picMk id="4" creationId="{B61E3BD1-D13F-47C6-BABB-A17F2F96FA08}"/>
+          </ac:picMkLst>
+        </pc:picChg>
       </pc:sldChg>
     </pc:docChg>
   </pc:docChgLst>
@@ -2645,7 +2708,7 @@
           <a:p>
             <a:fld id="{A8DE4784-5831-4D77-94A6-F282EA075FE8}" type="datetimeFigureOut">
               <a:rPr lang="en-IL" smtClean="0"/>
-              <a:t>04/11/2021</a:t>
+              <a:t>14/12/2021</a:t>
             </a:fld>
             <a:endParaRPr lang="en-IL"/>
           </a:p>
@@ -3267,7 +3330,7 @@
           <a:p>
             <a:fld id="{5AF13520-DA24-4CFD-B384-0F3A9F34B494}" type="datetimeFigureOut">
               <a:rPr lang="en-IL" smtClean="0"/>
-              <a:t>04/11/2021</a:t>
+              <a:t>14/12/2021</a:t>
             </a:fld>
             <a:endParaRPr lang="en-IL"/>
           </a:p>
@@ -3542,7 +3605,7 @@
           <a:p>
             <a:fld id="{5AF13520-DA24-4CFD-B384-0F3A9F34B494}" type="datetimeFigureOut">
               <a:rPr lang="en-IL" smtClean="0"/>
-              <a:t>04/11/2021</a:t>
+              <a:t>14/12/2021</a:t>
             </a:fld>
             <a:endParaRPr lang="en-IL"/>
           </a:p>
@@ -3736,7 +3799,7 @@
           <a:p>
             <a:fld id="{5AF13520-DA24-4CFD-B384-0F3A9F34B494}" type="datetimeFigureOut">
               <a:rPr lang="en-IL" smtClean="0"/>
-              <a:t>04/11/2021</a:t>
+              <a:t>14/12/2021</a:t>
             </a:fld>
             <a:endParaRPr lang="en-IL"/>
           </a:p>
@@ -4009,7 +4072,7 @@
           <a:p>
             <a:fld id="{5AF13520-DA24-4CFD-B384-0F3A9F34B494}" type="datetimeFigureOut">
               <a:rPr lang="en-IL" smtClean="0"/>
-              <a:t>04/11/2021</a:t>
+              <a:t>14/12/2021</a:t>
             </a:fld>
             <a:endParaRPr lang="en-IL"/>
           </a:p>
@@ -4350,7 +4413,7 @@
           <a:p>
             <a:fld id="{5AF13520-DA24-4CFD-B384-0F3A9F34B494}" type="datetimeFigureOut">
               <a:rPr lang="en-IL" smtClean="0"/>
-              <a:t>04/11/2021</a:t>
+              <a:t>14/12/2021</a:t>
             </a:fld>
             <a:endParaRPr lang="en-IL"/>
           </a:p>
@@ -4973,7 +5036,7 @@
           <a:p>
             <a:fld id="{5AF13520-DA24-4CFD-B384-0F3A9F34B494}" type="datetimeFigureOut">
               <a:rPr lang="en-IL" smtClean="0"/>
-              <a:t>04/11/2021</a:t>
+              <a:t>14/12/2021</a:t>
             </a:fld>
             <a:endParaRPr lang="en-IL"/>
           </a:p>
@@ -5833,7 +5896,7 @@
           <a:p>
             <a:fld id="{5AF13520-DA24-4CFD-B384-0F3A9F34B494}" type="datetimeFigureOut">
               <a:rPr lang="en-IL" smtClean="0"/>
-              <a:t>04/11/2021</a:t>
+              <a:t>14/12/2021</a:t>
             </a:fld>
             <a:endParaRPr lang="en-IL"/>
           </a:p>
@@ -6003,7 +6066,7 @@
           <a:p>
             <a:fld id="{5AF13520-DA24-4CFD-B384-0F3A9F34B494}" type="datetimeFigureOut">
               <a:rPr lang="en-IL" smtClean="0"/>
-              <a:t>04/11/2021</a:t>
+              <a:t>14/12/2021</a:t>
             </a:fld>
             <a:endParaRPr lang="en-IL"/>
           </a:p>
@@ -6183,7 +6246,7 @@
           <a:p>
             <a:fld id="{5AF13520-DA24-4CFD-B384-0F3A9F34B494}" type="datetimeFigureOut">
               <a:rPr lang="en-IL" smtClean="0"/>
-              <a:t>04/11/2021</a:t>
+              <a:t>14/12/2021</a:t>
             </a:fld>
             <a:endParaRPr lang="en-IL"/>
           </a:p>
@@ -6353,7 +6416,7 @@
           <a:p>
             <a:fld id="{5AF13520-DA24-4CFD-B384-0F3A9F34B494}" type="datetimeFigureOut">
               <a:rPr lang="en-IL" smtClean="0"/>
-              <a:t>04/11/2021</a:t>
+              <a:t>14/12/2021</a:t>
             </a:fld>
             <a:endParaRPr lang="en-IL"/>
           </a:p>
@@ -6600,7 +6663,7 @@
           <a:p>
             <a:fld id="{5AF13520-DA24-4CFD-B384-0F3A9F34B494}" type="datetimeFigureOut">
               <a:rPr lang="en-IL" smtClean="0"/>
-              <a:t>04/11/2021</a:t>
+              <a:t>14/12/2021</a:t>
             </a:fld>
             <a:endParaRPr lang="en-IL"/>
           </a:p>
@@ -6892,7 +6955,7 @@
           <a:p>
             <a:fld id="{5AF13520-DA24-4CFD-B384-0F3A9F34B494}" type="datetimeFigureOut">
               <a:rPr lang="en-IL" smtClean="0"/>
-              <a:t>04/11/2021</a:t>
+              <a:t>14/12/2021</a:t>
             </a:fld>
             <a:endParaRPr lang="en-IL"/>
           </a:p>
@@ -7336,7 +7399,7 @@
           <a:p>
             <a:fld id="{5AF13520-DA24-4CFD-B384-0F3A9F34B494}" type="datetimeFigureOut">
               <a:rPr lang="en-IL" smtClean="0"/>
-              <a:t>04/11/2021</a:t>
+              <a:t>14/12/2021</a:t>
             </a:fld>
             <a:endParaRPr lang="en-IL"/>
           </a:p>
@@ -7454,7 +7517,7 @@
           <a:p>
             <a:fld id="{5AF13520-DA24-4CFD-B384-0F3A9F34B494}" type="datetimeFigureOut">
               <a:rPr lang="en-IL" smtClean="0"/>
-              <a:t>04/11/2021</a:t>
+              <a:t>14/12/2021</a:t>
             </a:fld>
             <a:endParaRPr lang="en-IL"/>
           </a:p>
@@ -7549,7 +7612,7 @@
           <a:p>
             <a:fld id="{5AF13520-DA24-4CFD-B384-0F3A9F34B494}" type="datetimeFigureOut">
               <a:rPr lang="en-IL" smtClean="0"/>
-              <a:t>04/11/2021</a:t>
+              <a:t>14/12/2021</a:t>
             </a:fld>
             <a:endParaRPr lang="en-IL"/>
           </a:p>
@@ -7828,7 +7891,7 @@
           <a:p>
             <a:fld id="{5AF13520-DA24-4CFD-B384-0F3A9F34B494}" type="datetimeFigureOut">
               <a:rPr lang="en-IL" smtClean="0"/>
-              <a:t>04/11/2021</a:t>
+              <a:t>14/12/2021</a:t>
             </a:fld>
             <a:endParaRPr lang="en-IL"/>
           </a:p>
@@ -8103,7 +8166,7 @@
           <a:p>
             <a:fld id="{5AF13520-DA24-4CFD-B384-0F3A9F34B494}" type="datetimeFigureOut">
               <a:rPr lang="en-IL" smtClean="0"/>
-              <a:t>04/11/2021</a:t>
+              <a:t>14/12/2021</a:t>
             </a:fld>
             <a:endParaRPr lang="en-IL"/>
           </a:p>
@@ -8532,7 +8595,7 @@
           <a:p>
             <a:fld id="{5AF13520-DA24-4CFD-B384-0F3A9F34B494}" type="datetimeFigureOut">
               <a:rPr lang="en-IL" smtClean="0"/>
-              <a:t>04/11/2021</a:t>
+              <a:t>14/12/2021</a:t>
             </a:fld>
             <a:endParaRPr lang="en-IL"/>
           </a:p>
@@ -14644,7 +14707,7 @@
         </p:blipFill>
         <p:spPr>
           <a:xfrm>
-            <a:off x="646111" y="1238976"/>
+            <a:off x="646111" y="1250127"/>
             <a:ext cx="8483595" cy="5009424"/>
           </a:xfrm>
           <a:prstGeom prst="rect">
@@ -14823,38 +14886,6 @@
           </a:prstGeom>
         </p:spPr>
       </p:pic>
-      <p:pic>
-        <p:nvPicPr>
-          <p:cNvPr id="8" name="Content Placeholder 7">
-            <a:extLst>
-              <a:ext uri="{FF2B5EF4-FFF2-40B4-BE49-F238E27FC236}">
-                <a16:creationId xmlns:a16="http://schemas.microsoft.com/office/drawing/2014/main" id="{70815CBA-FA3B-434D-AD7D-204F7E89714C}"/>
-              </a:ext>
-            </a:extLst>
-          </p:cNvPr>
-          <p:cNvPicPr>
-            <a:picLocks noGrp="1" noChangeAspect="1"/>
-          </p:cNvPicPr>
-          <p:nvPr>
-            <p:ph idx="1"/>
-          </p:nvPr>
-        </p:nvPicPr>
-        <p:blipFill>
-          <a:blip r:embed="rId3"/>
-          <a:stretch>
-            <a:fillRect/>
-          </a:stretch>
-        </p:blipFill>
-        <p:spPr>
-          <a:xfrm>
-            <a:off x="646111" y="1238976"/>
-            <a:ext cx="8483595" cy="5009424"/>
-          </a:xfrm>
-          <a:prstGeom prst="rect">
-            <a:avLst/>
-          </a:prstGeom>
-        </p:spPr>
-      </p:pic>
       <p:sp>
         <p:nvSpPr>
           <p:cNvPr id="6" name="Rectangle: Rounded Corners 5">
@@ -14907,6 +14938,35 @@
           </a:p>
         </p:txBody>
       </p:sp>
+      <p:pic>
+        <p:nvPicPr>
+          <p:cNvPr id="13" name="Content Placeholder 12">
+            <a:extLst>
+              <a:ext uri="{FF2B5EF4-FFF2-40B4-BE49-F238E27FC236}">
+                <a16:creationId xmlns:a16="http://schemas.microsoft.com/office/drawing/2014/main" id="{5B6AAFD8-69FD-491F-BFA7-F0ED6C66654D}"/>
+              </a:ext>
+            </a:extLst>
+          </p:cNvPr>
+          <p:cNvPicPr>
+            <a:picLocks noGrp="1" noChangeAspect="1"/>
+          </p:cNvPicPr>
+          <p:nvPr>
+            <p:ph idx="1"/>
+          </p:nvPr>
+        </p:nvPicPr>
+        <p:blipFill>
+          <a:blip r:embed="rId3"/>
+          <a:stretch>
+            <a:fillRect/>
+          </a:stretch>
+        </p:blipFill>
+        <p:spPr>
+          <a:xfrm>
+            <a:off x="646111" y="1226779"/>
+            <a:ext cx="8485926" cy="5011200"/>
+          </a:xfrm>
+        </p:spPr>
+      </p:pic>
     </p:spTree>
     <p:extLst>
       <p:ext uri="{BB962C8B-B14F-4D97-AF65-F5344CB8AC3E}">

</xml_diff>

<commit_message>
Add 5 stages pipeline to the core - no hazard detection or forwarding unit yet
</commit_message>
<xml_diff>
--- a/doc/rvc_asap.pptx
+++ b/doc/rvc_asap.pptx
@@ -5,7 +5,7 @@
     <p:sldMasterId id="2147483990" r:id="rId1"/>
   </p:sldMasterIdLst>
   <p:notesMasterIdLst>
-    <p:notesMasterId r:id="rId38"/>
+    <p:notesMasterId r:id="rId39"/>
   </p:notesMasterIdLst>
   <p:sldIdLst>
     <p:sldId id="256" r:id="rId2"/>
@@ -40,10 +40,11 @@
     <p:sldId id="286" r:id="rId31"/>
     <p:sldId id="288" r:id="rId32"/>
     <p:sldId id="290" r:id="rId33"/>
-    <p:sldId id="291" r:id="rId34"/>
-    <p:sldId id="289" r:id="rId35"/>
-    <p:sldId id="294" r:id="rId36"/>
-    <p:sldId id="295" r:id="rId37"/>
+    <p:sldId id="296" r:id="rId34"/>
+    <p:sldId id="291" r:id="rId35"/>
+    <p:sldId id="289" r:id="rId36"/>
+    <p:sldId id="294" r:id="rId37"/>
+    <p:sldId id="295" r:id="rId38"/>
   </p:sldIdLst>
   <p:sldSz cx="12192000" cy="6858000"/>
   <p:notesSz cx="6858000" cy="9144000"/>
@@ -2708,7 +2709,7 @@
           <a:p>
             <a:fld id="{A8DE4784-5831-4D77-94A6-F282EA075FE8}" type="datetimeFigureOut">
               <a:rPr lang="en-IL" smtClean="0"/>
-              <a:t>14/12/2021</a:t>
+              <a:t>04/07/2022</a:t>
             </a:fld>
             <a:endParaRPr lang="en-IL"/>
           </a:p>
@@ -3330,7 +3331,7 @@
           <a:p>
             <a:fld id="{5AF13520-DA24-4CFD-B384-0F3A9F34B494}" type="datetimeFigureOut">
               <a:rPr lang="en-IL" smtClean="0"/>
-              <a:t>14/12/2021</a:t>
+              <a:t>04/07/2022</a:t>
             </a:fld>
             <a:endParaRPr lang="en-IL"/>
           </a:p>
@@ -3605,7 +3606,7 @@
           <a:p>
             <a:fld id="{5AF13520-DA24-4CFD-B384-0F3A9F34B494}" type="datetimeFigureOut">
               <a:rPr lang="en-IL" smtClean="0"/>
-              <a:t>14/12/2021</a:t>
+              <a:t>04/07/2022</a:t>
             </a:fld>
             <a:endParaRPr lang="en-IL"/>
           </a:p>
@@ -3799,7 +3800,7 @@
           <a:p>
             <a:fld id="{5AF13520-DA24-4CFD-B384-0F3A9F34B494}" type="datetimeFigureOut">
               <a:rPr lang="en-IL" smtClean="0"/>
-              <a:t>14/12/2021</a:t>
+              <a:t>04/07/2022</a:t>
             </a:fld>
             <a:endParaRPr lang="en-IL"/>
           </a:p>
@@ -4072,7 +4073,7 @@
           <a:p>
             <a:fld id="{5AF13520-DA24-4CFD-B384-0F3A9F34B494}" type="datetimeFigureOut">
               <a:rPr lang="en-IL" smtClean="0"/>
-              <a:t>14/12/2021</a:t>
+              <a:t>04/07/2022</a:t>
             </a:fld>
             <a:endParaRPr lang="en-IL"/>
           </a:p>
@@ -4413,7 +4414,7 @@
           <a:p>
             <a:fld id="{5AF13520-DA24-4CFD-B384-0F3A9F34B494}" type="datetimeFigureOut">
               <a:rPr lang="en-IL" smtClean="0"/>
-              <a:t>14/12/2021</a:t>
+              <a:t>04/07/2022</a:t>
             </a:fld>
             <a:endParaRPr lang="en-IL"/>
           </a:p>
@@ -5036,7 +5037,7 @@
           <a:p>
             <a:fld id="{5AF13520-DA24-4CFD-B384-0F3A9F34B494}" type="datetimeFigureOut">
               <a:rPr lang="en-IL" smtClean="0"/>
-              <a:t>14/12/2021</a:t>
+              <a:t>04/07/2022</a:t>
             </a:fld>
             <a:endParaRPr lang="en-IL"/>
           </a:p>
@@ -5896,7 +5897,7 @@
           <a:p>
             <a:fld id="{5AF13520-DA24-4CFD-B384-0F3A9F34B494}" type="datetimeFigureOut">
               <a:rPr lang="en-IL" smtClean="0"/>
-              <a:t>14/12/2021</a:t>
+              <a:t>04/07/2022</a:t>
             </a:fld>
             <a:endParaRPr lang="en-IL"/>
           </a:p>
@@ -6066,7 +6067,7 @@
           <a:p>
             <a:fld id="{5AF13520-DA24-4CFD-B384-0F3A9F34B494}" type="datetimeFigureOut">
               <a:rPr lang="en-IL" smtClean="0"/>
-              <a:t>14/12/2021</a:t>
+              <a:t>04/07/2022</a:t>
             </a:fld>
             <a:endParaRPr lang="en-IL"/>
           </a:p>
@@ -6246,7 +6247,7 @@
           <a:p>
             <a:fld id="{5AF13520-DA24-4CFD-B384-0F3A9F34B494}" type="datetimeFigureOut">
               <a:rPr lang="en-IL" smtClean="0"/>
-              <a:t>14/12/2021</a:t>
+              <a:t>04/07/2022</a:t>
             </a:fld>
             <a:endParaRPr lang="en-IL"/>
           </a:p>
@@ -6416,7 +6417,7 @@
           <a:p>
             <a:fld id="{5AF13520-DA24-4CFD-B384-0F3A9F34B494}" type="datetimeFigureOut">
               <a:rPr lang="en-IL" smtClean="0"/>
-              <a:t>14/12/2021</a:t>
+              <a:t>04/07/2022</a:t>
             </a:fld>
             <a:endParaRPr lang="en-IL"/>
           </a:p>
@@ -6663,7 +6664,7 @@
           <a:p>
             <a:fld id="{5AF13520-DA24-4CFD-B384-0F3A9F34B494}" type="datetimeFigureOut">
               <a:rPr lang="en-IL" smtClean="0"/>
-              <a:t>14/12/2021</a:t>
+              <a:t>04/07/2022</a:t>
             </a:fld>
             <a:endParaRPr lang="en-IL"/>
           </a:p>
@@ -6955,7 +6956,7 @@
           <a:p>
             <a:fld id="{5AF13520-DA24-4CFD-B384-0F3A9F34B494}" type="datetimeFigureOut">
               <a:rPr lang="en-IL" smtClean="0"/>
-              <a:t>14/12/2021</a:t>
+              <a:t>04/07/2022</a:t>
             </a:fld>
             <a:endParaRPr lang="en-IL"/>
           </a:p>
@@ -7399,7 +7400,7 @@
           <a:p>
             <a:fld id="{5AF13520-DA24-4CFD-B384-0F3A9F34B494}" type="datetimeFigureOut">
               <a:rPr lang="en-IL" smtClean="0"/>
-              <a:t>14/12/2021</a:t>
+              <a:t>04/07/2022</a:t>
             </a:fld>
             <a:endParaRPr lang="en-IL"/>
           </a:p>
@@ -7517,7 +7518,7 @@
           <a:p>
             <a:fld id="{5AF13520-DA24-4CFD-B384-0F3A9F34B494}" type="datetimeFigureOut">
               <a:rPr lang="en-IL" smtClean="0"/>
-              <a:t>14/12/2021</a:t>
+              <a:t>04/07/2022</a:t>
             </a:fld>
             <a:endParaRPr lang="en-IL"/>
           </a:p>
@@ -7612,7 +7613,7 @@
           <a:p>
             <a:fld id="{5AF13520-DA24-4CFD-B384-0F3A9F34B494}" type="datetimeFigureOut">
               <a:rPr lang="en-IL" smtClean="0"/>
-              <a:t>14/12/2021</a:t>
+              <a:t>04/07/2022</a:t>
             </a:fld>
             <a:endParaRPr lang="en-IL"/>
           </a:p>
@@ -7891,7 +7892,7 @@
           <a:p>
             <a:fld id="{5AF13520-DA24-4CFD-B384-0F3A9F34B494}" type="datetimeFigureOut">
               <a:rPr lang="en-IL" smtClean="0"/>
-              <a:t>14/12/2021</a:t>
+              <a:t>04/07/2022</a:t>
             </a:fld>
             <a:endParaRPr lang="en-IL"/>
           </a:p>
@@ -8166,7 +8167,7 @@
           <a:p>
             <a:fld id="{5AF13520-DA24-4CFD-B384-0F3A9F34B494}" type="datetimeFigureOut">
               <a:rPr lang="en-IL" smtClean="0"/>
-              <a:t>14/12/2021</a:t>
+              <a:t>04/07/2022</a:t>
             </a:fld>
             <a:endParaRPr lang="en-IL"/>
           </a:p>
@@ -8595,7 +8596,7 @@
           <a:p>
             <a:fld id="{5AF13520-DA24-4CFD-B384-0F3A9F34B494}" type="datetimeFigureOut">
               <a:rPr lang="en-IL" smtClean="0"/>
-              <a:t>14/12/2021</a:t>
+              <a:t>04/07/2022</a:t>
             </a:fld>
             <a:endParaRPr lang="en-IL"/>
           </a:p>
@@ -9188,16 +9189,48 @@
             <p:ph type="subTitle" idx="1"/>
           </p:nvPr>
         </p:nvSpPr>
-        <p:spPr/>
+        <p:spPr>
+          <a:xfrm>
+            <a:off x="1154955" y="5486040"/>
+            <a:ext cx="8825658" cy="861420"/>
+          </a:xfrm>
+        </p:spPr>
         <p:txBody>
           <a:bodyPr/>
           <a:lstStyle/>
           <a:p>
             <a:r>
               <a:rPr lang="en-US" dirty="0"/>
-              <a:t>Amichai Ben-David</a:t>
-            </a:r>
-            <a:endParaRPr lang="en-IL" dirty="0"/>
+              <a:t>Project facilitator: </a:t>
+            </a:r>
+            <a:r>
+              <a:rPr lang="en-US" dirty="0" err="1"/>
+              <a:t>Amichai</a:t>
+            </a:r>
+            <a:r>
+              <a:rPr lang="en-US" dirty="0"/>
+              <a:t> Ben-David</a:t>
+            </a:r>
+            <a:br>
+              <a:rPr lang="en-US" dirty="0"/>
+            </a:br>
+            <a:r>
+              <a:rPr lang="en-US" dirty="0"/>
+              <a:t>Students: Gil </a:t>
+            </a:r>
+            <a:r>
+              <a:rPr lang="en-US" dirty="0" err="1"/>
+              <a:t>ya’akov</a:t>
+            </a:r>
+            <a:r>
+              <a:rPr lang="en-US" dirty="0"/>
+              <a:t> &amp; Matan </a:t>
+            </a:r>
+            <a:r>
+              <a:rPr lang="en-US" dirty="0" err="1"/>
+              <a:t>eshel</a:t>
+            </a:r>
+            <a:endParaRPr lang="en-US" dirty="0"/>
           </a:p>
         </p:txBody>
       </p:sp>
@@ -14092,13 +14125,14 @@
           <a:p>
             <a:r>
               <a:rPr lang="en-US" dirty="0"/>
-              <a:t>Git and </a:t>
-            </a:r>
-            <a:r>
-              <a:rPr lang="en-US"/>
-              <a:t>repository structure</a:t>
-            </a:r>
-            <a:endParaRPr lang="en-US" dirty="0"/>
+              <a:t>Git and repository structure</a:t>
+            </a:r>
+          </a:p>
+          <a:p>
+            <a:r>
+              <a:rPr lang="en-US" dirty="0"/>
+              <a:t>What’s next?</a:t>
+            </a:r>
           </a:p>
           <a:p>
             <a:endParaRPr lang="en-US" dirty="0"/>
@@ -15140,7 +15174,7 @@
           <a:lstStyle/>
           <a:p>
             <a:r>
-              <a:rPr lang="en-US" dirty="0"/>
+              <a:rPr lang="en-US"/>
               <a:t>Data Path</a:t>
             </a:r>
             <a:endParaRPr lang="en-IL" dirty="0"/>
@@ -15164,15 +15198,20 @@
           </p:nvPr>
         </p:nvPicPr>
         <p:blipFill>
-          <a:blip r:embed="rId2"/>
-          <a:stretch>
-            <a:fillRect/>
-          </a:stretch>
+          <a:blip r:embed="rId2">
+            <a:extLst>
+              <a:ext uri="{28A0092B-C50C-407E-A947-70E740481C1C}">
+                <a14:useLocalDpi xmlns:a14="http://schemas.microsoft.com/office/drawing/2010/main" val="0"/>
+              </a:ext>
+            </a:extLst>
+          </a:blip>
+          <a:srcRect/>
+          <a:stretch/>
         </p:blipFill>
         <p:spPr>
           <a:xfrm>
-            <a:off x="5348471" y="2078387"/>
-            <a:ext cx="6788525" cy="4008514"/>
+            <a:off x="4727149" y="1269955"/>
+            <a:ext cx="7373412" cy="5462315"/>
           </a:xfrm>
           <a:prstGeom prst="rect">
             <a:avLst/>
@@ -15193,8 +15232,8 @@
         </p:nvSpPr>
         <p:spPr>
           <a:xfrm>
-            <a:off x="220994" y="1913670"/>
-            <a:ext cx="4432818" cy="4739759"/>
+            <a:off x="91439" y="1913670"/>
+            <a:ext cx="4562373" cy="4739759"/>
           </a:xfrm>
           <a:prstGeom prst="rect">
             <a:avLst/>
@@ -15274,7 +15313,21 @@
                 <a:latin typeface="Courier New" panose="02070309020205020404" pitchFamily="49" charset="0"/>
                 <a:cs typeface="Courier New" panose="02070309020205020404" pitchFamily="49" charset="0"/>
               </a:rPr>
-              <a:t> [31:0]       NextPc;</a:t>
+              <a:t> [31:0]       </a:t>
+            </a:r>
+            <a:r>
+              <a:rPr lang="en-US" sz="1400" dirty="0" err="1">
+                <a:latin typeface="Courier New" panose="02070309020205020404" pitchFamily="49" charset="0"/>
+                <a:cs typeface="Courier New" panose="02070309020205020404" pitchFamily="49" charset="0"/>
+              </a:rPr>
+              <a:t>NextPc</a:t>
+            </a:r>
+            <a:r>
+              <a:rPr lang="en-US" sz="1400" dirty="0">
+                <a:latin typeface="Courier New" panose="02070309020205020404" pitchFamily="49" charset="0"/>
+                <a:cs typeface="Courier New" panose="02070309020205020404" pitchFamily="49" charset="0"/>
+              </a:rPr>
+              <a:t>;</a:t>
             </a:r>
           </a:p>
           <a:p>
@@ -15384,7 +15437,21 @@
                 <a:latin typeface="Courier New" panose="02070309020205020404" pitchFamily="49" charset="0"/>
                 <a:cs typeface="Courier New" panose="02070309020205020404" pitchFamily="49" charset="0"/>
               </a:rPr>
-              <a:t> [4:0]        Shamt;</a:t>
+              <a:t> [4:0]        </a:t>
+            </a:r>
+            <a:r>
+              <a:rPr lang="en-US" sz="1400" dirty="0" err="1">
+                <a:latin typeface="Courier New" panose="02070309020205020404" pitchFamily="49" charset="0"/>
+                <a:cs typeface="Courier New" panose="02070309020205020404" pitchFamily="49" charset="0"/>
+              </a:rPr>
+              <a:t>Shamt</a:t>
+            </a:r>
+            <a:r>
+              <a:rPr lang="en-US" sz="1400" dirty="0">
+                <a:latin typeface="Courier New" panose="02070309020205020404" pitchFamily="49" charset="0"/>
+                <a:cs typeface="Courier New" panose="02070309020205020404" pitchFamily="49" charset="0"/>
+              </a:rPr>
+              <a:t>;</a:t>
             </a:r>
           </a:p>
           <a:p>
@@ -15406,7 +15473,21 @@
                 <a:latin typeface="Courier New" panose="02070309020205020404" pitchFamily="49" charset="0"/>
                 <a:cs typeface="Courier New" panose="02070309020205020404" pitchFamily="49" charset="0"/>
               </a:rPr>
-              <a:t> [31:0]       PreDMemRdDatal</a:t>
+              <a:t> [31:0]       </a:t>
+            </a:r>
+            <a:r>
+              <a:rPr lang="en-US" sz="1400" dirty="0" err="1">
+                <a:latin typeface="Courier New" panose="02070309020205020404" pitchFamily="49" charset="0"/>
+                <a:cs typeface="Courier New" panose="02070309020205020404" pitchFamily="49" charset="0"/>
+              </a:rPr>
+              <a:t>PreDMemRdData</a:t>
+            </a:r>
+            <a:r>
+              <a:rPr lang="en-US" sz="1400" dirty="0">
+                <a:latin typeface="Courier New" panose="02070309020205020404" pitchFamily="49" charset="0"/>
+                <a:cs typeface="Courier New" panose="02070309020205020404" pitchFamily="49" charset="0"/>
+              </a:rPr>
+              <a:t>;</a:t>
             </a:r>
           </a:p>
           <a:p>
@@ -15428,7 +15509,21 @@
                 <a:latin typeface="Courier New" panose="02070309020205020404" pitchFamily="49" charset="0"/>
                 <a:cs typeface="Courier New" panose="02070309020205020404" pitchFamily="49" charset="0"/>
               </a:rPr>
-              <a:t> [31:0]       DMemRdData;</a:t>
+              <a:t> [31:0]       </a:t>
+            </a:r>
+            <a:r>
+              <a:rPr lang="en-US" sz="1400" dirty="0" err="1">
+                <a:latin typeface="Courier New" panose="02070309020205020404" pitchFamily="49" charset="0"/>
+                <a:cs typeface="Courier New" panose="02070309020205020404" pitchFamily="49" charset="0"/>
+              </a:rPr>
+              <a:t>DMemRdData</a:t>
+            </a:r>
+            <a:r>
+              <a:rPr lang="en-US" sz="1400" dirty="0">
+                <a:latin typeface="Courier New" panose="02070309020205020404" pitchFamily="49" charset="0"/>
+                <a:cs typeface="Courier New" panose="02070309020205020404" pitchFamily="49" charset="0"/>
+              </a:rPr>
+              <a:t>;</a:t>
             </a:r>
           </a:p>
           <a:p>
@@ -15494,7 +15589,21 @@
                 <a:latin typeface="Courier New" panose="02070309020205020404" pitchFamily="49" charset="0"/>
                 <a:cs typeface="Courier New" panose="02070309020205020404" pitchFamily="49" charset="0"/>
               </a:rPr>
-              <a:t> [31:0]       AluOut;</a:t>
+              <a:t> [31:0]       </a:t>
+            </a:r>
+            <a:r>
+              <a:rPr lang="en-US" sz="1400" dirty="0" err="1">
+                <a:latin typeface="Courier New" panose="02070309020205020404" pitchFamily="49" charset="0"/>
+                <a:cs typeface="Courier New" panose="02070309020205020404" pitchFamily="49" charset="0"/>
+              </a:rPr>
+              <a:t>AluOut</a:t>
+            </a:r>
+            <a:r>
+              <a:rPr lang="en-US" sz="1400" dirty="0">
+                <a:latin typeface="Courier New" panose="02070309020205020404" pitchFamily="49" charset="0"/>
+                <a:cs typeface="Courier New" panose="02070309020205020404" pitchFamily="49" charset="0"/>
+              </a:rPr>
+              <a:t>;</a:t>
             </a:r>
           </a:p>
           <a:p>
@@ -15560,7 +15669,21 @@
                 <a:latin typeface="Courier New" panose="02070309020205020404" pitchFamily="49" charset="0"/>
                 <a:cs typeface="Courier New" panose="02070309020205020404" pitchFamily="49" charset="0"/>
               </a:rPr>
-              <a:t> [31:0]       RegWrData; </a:t>
+              <a:t> [31:0]       </a:t>
+            </a:r>
+            <a:r>
+              <a:rPr lang="en-US" sz="1400" dirty="0" err="1">
+                <a:latin typeface="Courier New" panose="02070309020205020404" pitchFamily="49" charset="0"/>
+                <a:cs typeface="Courier New" panose="02070309020205020404" pitchFamily="49" charset="0"/>
+              </a:rPr>
+              <a:t>RegWrData</a:t>
+            </a:r>
+            <a:r>
+              <a:rPr lang="en-US" sz="1400" dirty="0">
+                <a:latin typeface="Courier New" panose="02070309020205020404" pitchFamily="49" charset="0"/>
+                <a:cs typeface="Courier New" panose="02070309020205020404" pitchFamily="49" charset="0"/>
+              </a:rPr>
+              <a:t>; </a:t>
             </a:r>
           </a:p>
           <a:p>
@@ -15582,7 +15705,21 @@
                 <a:latin typeface="Courier New" panose="02070309020205020404" pitchFamily="49" charset="0"/>
                 <a:cs typeface="Courier New" panose="02070309020205020404" pitchFamily="49" charset="0"/>
               </a:rPr>
-              <a:t> [31:0]       WrBackData;</a:t>
+              <a:t> [31:0]       </a:t>
+            </a:r>
+            <a:r>
+              <a:rPr lang="en-US" sz="1400" dirty="0" err="1">
+                <a:latin typeface="Courier New" panose="02070309020205020404" pitchFamily="49" charset="0"/>
+                <a:cs typeface="Courier New" panose="02070309020205020404" pitchFamily="49" charset="0"/>
+              </a:rPr>
+              <a:t>WrBackData</a:t>
+            </a:r>
+            <a:r>
+              <a:rPr lang="en-US" sz="1400" dirty="0">
+                <a:latin typeface="Courier New" panose="02070309020205020404" pitchFamily="49" charset="0"/>
+                <a:cs typeface="Courier New" panose="02070309020205020404" pitchFamily="49" charset="0"/>
+              </a:rPr>
+              <a:t>; </a:t>
             </a:r>
           </a:p>
           <a:p>
@@ -15634,7 +15771,7 @@
           </a:p>
           <a:p>
             <a:r>
-              <a:rPr lang="pt-BR" sz="1400" dirty="0">
+              <a:rPr lang="en-US" sz="1400" dirty="0">
                 <a:solidFill>
                   <a:schemeClr val="bg2">
                     <a:lumMod val="40000"/>
@@ -15647,16 +15784,40 @@
               <a:t>logic</a:t>
             </a:r>
             <a:r>
-              <a:rPr lang="pt-BR" sz="1400" dirty="0">
-                <a:latin typeface="Courier New" panose="02070309020205020404" pitchFamily="49" charset="0"/>
-                <a:cs typeface="Courier New" panose="02070309020205020404" pitchFamily="49" charset="0"/>
-              </a:rPr>
-              <a:t> [7:0]IMem[I_MEM_MSB:0];</a:t>
-            </a:r>
-          </a:p>
-          <a:p>
-            <a:r>
-              <a:rPr lang="pt-BR" sz="1400" dirty="0">
+              <a:rPr lang="en-US" sz="1400" dirty="0">
+                <a:latin typeface="Courier New" panose="02070309020205020404" pitchFamily="49" charset="0"/>
+                <a:cs typeface="Courier New" panose="02070309020205020404" pitchFamily="49" charset="0"/>
+              </a:rPr>
+              <a:t> [7:0] </a:t>
+            </a:r>
+            <a:r>
+              <a:rPr lang="en-US" sz="1400" dirty="0" err="1">
+                <a:latin typeface="Courier New" panose="02070309020205020404" pitchFamily="49" charset="0"/>
+                <a:cs typeface="Courier New" panose="02070309020205020404" pitchFamily="49" charset="0"/>
+              </a:rPr>
+              <a:t>Imem</a:t>
+            </a:r>
+            <a:r>
+              <a:rPr lang="en-US" sz="1400" dirty="0">
+                <a:latin typeface="Courier New" panose="02070309020205020404" pitchFamily="49" charset="0"/>
+                <a:cs typeface="Courier New" panose="02070309020205020404" pitchFamily="49" charset="0"/>
+              </a:rPr>
+              <a:t> [I_MEM_MSB:0];</a:t>
+            </a:r>
+            <a:endParaRPr lang="en-US" sz="1400" b="1" dirty="0">
+              <a:solidFill>
+                <a:schemeClr val="accent4">
+                  <a:lumMod val="60000"/>
+                  <a:lumOff val="40000"/>
+                </a:schemeClr>
+              </a:solidFill>
+              <a:latin typeface="Courier New" panose="02070309020205020404" pitchFamily="49" charset="0"/>
+              <a:cs typeface="Courier New" panose="02070309020205020404" pitchFamily="49" charset="0"/>
+            </a:endParaRPr>
+          </a:p>
+          <a:p>
+            <a:r>
+              <a:rPr lang="en-US" sz="1400" dirty="0">
                 <a:solidFill>
                   <a:schemeClr val="bg2">
                     <a:lumMod val="40000"/>
@@ -15669,20 +15830,33 @@
               <a:t>logic</a:t>
             </a:r>
             <a:r>
-              <a:rPr lang="pt-BR" sz="1400" dirty="0">
-                <a:latin typeface="Courier New" panose="02070309020205020404" pitchFamily="49" charset="0"/>
-                <a:cs typeface="Courier New" panose="02070309020205020404" pitchFamily="49" charset="0"/>
-              </a:rPr>
-              <a:t> [7:0]Dmem[D_MEM_MSB:I_MEM_MSB+1];</a:t>
-            </a:r>
-            <a:r>
-              <a:rPr lang="en-US" sz="1400" dirty="0">
-                <a:latin typeface="Courier New" panose="02070309020205020404" pitchFamily="49" charset="0"/>
-                <a:cs typeface="Courier New" panose="02070309020205020404" pitchFamily="49" charset="0"/>
-              </a:rPr>
-              <a:t> </a:t>
-            </a:r>
-            <a:endParaRPr lang="pt-BR" sz="1600" dirty="0">
+              <a:rPr lang="en-US" sz="1400" dirty="0">
+                <a:latin typeface="Courier New" panose="02070309020205020404" pitchFamily="49" charset="0"/>
+                <a:cs typeface="Courier New" panose="02070309020205020404" pitchFamily="49" charset="0"/>
+              </a:rPr>
+              <a:t> [7:0] </a:t>
+            </a:r>
+            <a:r>
+              <a:rPr lang="en-US" sz="1400" dirty="0" err="1">
+                <a:latin typeface="Courier New" panose="02070309020205020404" pitchFamily="49" charset="0"/>
+                <a:cs typeface="Courier New" panose="02070309020205020404" pitchFamily="49" charset="0"/>
+              </a:rPr>
+              <a:t>Dmem</a:t>
+            </a:r>
+            <a:r>
+              <a:rPr lang="en-US" sz="1400" dirty="0">
+                <a:latin typeface="Courier New" panose="02070309020205020404" pitchFamily="49" charset="0"/>
+                <a:cs typeface="Courier New" panose="02070309020205020404" pitchFamily="49" charset="0"/>
+              </a:rPr>
+              <a:t> [D_MEM_MSB:I_MEM_MSB+1];</a:t>
+            </a:r>
+            <a:endParaRPr lang="en-US" sz="1400" b="1" dirty="0">
+              <a:solidFill>
+                <a:schemeClr val="accent4">
+                  <a:lumMod val="60000"/>
+                  <a:lumOff val="40000"/>
+                </a:schemeClr>
+              </a:solidFill>
               <a:latin typeface="Courier New" panose="02070309020205020404" pitchFamily="49" charset="0"/>
               <a:cs typeface="Courier New" panose="02070309020205020404" pitchFamily="49" charset="0"/>
             </a:endParaRPr>
@@ -15748,38 +15922,6 @@
           </a:p>
         </p:txBody>
       </p:sp>
-      <p:pic>
-        <p:nvPicPr>
-          <p:cNvPr id="7" name="Content Placeholder 3">
-            <a:extLst>
-              <a:ext uri="{FF2B5EF4-FFF2-40B4-BE49-F238E27FC236}">
-                <a16:creationId xmlns:a16="http://schemas.microsoft.com/office/drawing/2014/main" id="{D34C99EF-C428-4D79-ADA5-7D4A3EBF710D}"/>
-              </a:ext>
-            </a:extLst>
-          </p:cNvPr>
-          <p:cNvPicPr>
-            <a:picLocks noGrp="1" noChangeAspect="1"/>
-          </p:cNvPicPr>
-          <p:nvPr>
-            <p:ph idx="1"/>
-          </p:nvPr>
-        </p:nvPicPr>
-        <p:blipFill>
-          <a:blip r:embed="rId2"/>
-          <a:stretch>
-            <a:fillRect/>
-          </a:stretch>
-        </p:blipFill>
-        <p:spPr>
-          <a:xfrm>
-            <a:off x="5348471" y="2078387"/>
-            <a:ext cx="6788525" cy="4008514"/>
-          </a:xfrm>
-          <a:prstGeom prst="rect">
-            <a:avLst/>
-          </a:prstGeom>
-        </p:spPr>
-      </p:pic>
       <p:sp>
         <p:nvSpPr>
           <p:cNvPr id="10" name="Rectangle 9">
@@ -15795,7 +15937,7 @@
         <p:spPr>
           <a:xfrm>
             <a:off x="206514" y="1913670"/>
-            <a:ext cx="4447298" cy="4739759"/>
+            <a:ext cx="4447298" cy="4308872"/>
           </a:xfrm>
           <a:prstGeom prst="rect">
             <a:avLst/>
@@ -15853,7 +15995,21 @@
                 <a:latin typeface="Courier New" panose="02070309020205020404" pitchFamily="49" charset="0"/>
                 <a:cs typeface="Courier New" panose="02070309020205020404" pitchFamily="49" charset="0"/>
               </a:rPr>
-              <a:t>         SelNextPcAluOut;</a:t>
+              <a:t>         </a:t>
+            </a:r>
+            <a:r>
+              <a:rPr lang="en-US" sz="1400" dirty="0" err="1">
+                <a:latin typeface="Courier New" panose="02070309020205020404" pitchFamily="49" charset="0"/>
+                <a:cs typeface="Courier New" panose="02070309020205020404" pitchFamily="49" charset="0"/>
+              </a:rPr>
+              <a:t>SelNextPcAluOut</a:t>
+            </a:r>
+            <a:r>
+              <a:rPr lang="en-US" sz="1400" dirty="0">
+                <a:latin typeface="Courier New" panose="02070309020205020404" pitchFamily="49" charset="0"/>
+                <a:cs typeface="Courier New" panose="02070309020205020404" pitchFamily="49" charset="0"/>
+              </a:rPr>
+              <a:t>;</a:t>
             </a:r>
           </a:p>
           <a:p>
@@ -15875,7 +16031,21 @@
                 <a:latin typeface="Courier New" panose="02070309020205020404" pitchFamily="49" charset="0"/>
                 <a:cs typeface="Courier New" panose="02070309020205020404" pitchFamily="49" charset="0"/>
               </a:rPr>
-              <a:t>         SelRegWrPc; </a:t>
+              <a:t>         </a:t>
+            </a:r>
+            <a:r>
+              <a:rPr lang="en-US" sz="1400" dirty="0" err="1">
+                <a:latin typeface="Courier New" panose="02070309020205020404" pitchFamily="49" charset="0"/>
+                <a:cs typeface="Courier New" panose="02070309020205020404" pitchFamily="49" charset="0"/>
+              </a:rPr>
+              <a:t>SelRegWrPc</a:t>
+            </a:r>
+            <a:r>
+              <a:rPr lang="en-US" sz="1400" dirty="0">
+                <a:latin typeface="Courier New" panose="02070309020205020404" pitchFamily="49" charset="0"/>
+                <a:cs typeface="Courier New" panose="02070309020205020404" pitchFamily="49" charset="0"/>
+              </a:rPr>
+              <a:t>;</a:t>
             </a:r>
           </a:p>
           <a:p>
@@ -15897,7 +16067,21 @@
                 <a:latin typeface="Courier New" panose="02070309020205020404" pitchFamily="49" charset="0"/>
                 <a:cs typeface="Courier New" panose="02070309020205020404" pitchFamily="49" charset="0"/>
               </a:rPr>
-              <a:t>         SelDMemWb;</a:t>
+              <a:t>         </a:t>
+            </a:r>
+            <a:r>
+              <a:rPr lang="en-US" sz="1400" dirty="0" err="1">
+                <a:latin typeface="Courier New" panose="02070309020205020404" pitchFamily="49" charset="0"/>
+                <a:cs typeface="Courier New" panose="02070309020205020404" pitchFamily="49" charset="0"/>
+              </a:rPr>
+              <a:t>BranchCondMet</a:t>
+            </a:r>
+            <a:r>
+              <a:rPr lang="en-US" sz="1400" dirty="0">
+                <a:latin typeface="Courier New" panose="02070309020205020404" pitchFamily="49" charset="0"/>
+                <a:cs typeface="Courier New" panose="02070309020205020404" pitchFamily="49" charset="0"/>
+              </a:rPr>
+              <a:t>; </a:t>
             </a:r>
           </a:p>
           <a:p>
@@ -15919,7 +16103,21 @@
                 <a:latin typeface="Courier New" panose="02070309020205020404" pitchFamily="49" charset="0"/>
                 <a:cs typeface="Courier New" panose="02070309020205020404" pitchFamily="49" charset="0"/>
               </a:rPr>
-              <a:t>         SelAluPc ;</a:t>
+              <a:t>         </a:t>
+            </a:r>
+            <a:r>
+              <a:rPr lang="en-US" sz="1400" dirty="0" err="1">
+                <a:latin typeface="Courier New" panose="02070309020205020404" pitchFamily="49" charset="0"/>
+                <a:cs typeface="Courier New" panose="02070309020205020404" pitchFamily="49" charset="0"/>
+              </a:rPr>
+              <a:t>SelDMemWb</a:t>
+            </a:r>
+            <a:r>
+              <a:rPr lang="en-US" sz="1400" dirty="0">
+                <a:latin typeface="Courier New" panose="02070309020205020404" pitchFamily="49" charset="0"/>
+                <a:cs typeface="Courier New" panose="02070309020205020404" pitchFamily="49" charset="0"/>
+              </a:rPr>
+              <a:t>;</a:t>
             </a:r>
           </a:p>
           <a:p>
@@ -15941,36 +16139,21 @@
                 <a:latin typeface="Courier New" panose="02070309020205020404" pitchFamily="49" charset="0"/>
                 <a:cs typeface="Courier New" panose="02070309020205020404" pitchFamily="49" charset="0"/>
               </a:rPr>
-              <a:t>         SelAluImm;</a:t>
-            </a:r>
-          </a:p>
-          <a:p>
+              <a:t>         </a:t>
+            </a:r>
             <a:r>
               <a:rPr lang="en-US" sz="1400" dirty="0" err="1">
-                <a:solidFill>
-                  <a:srgbClr val="E6F8A6"/>
-                </a:solidFill>
-                <a:latin typeface="Courier New" panose="02070309020205020404" pitchFamily="49" charset="0"/>
-                <a:cs typeface="Courier New" panose="02070309020205020404" pitchFamily="49" charset="0"/>
-              </a:rPr>
-              <a:t>t_immediate</a:t>
-            </a:r>
-            <a:r>
-              <a:rPr lang="en-US" sz="1400" dirty="0">
-                <a:solidFill>
-                  <a:srgbClr val="E6F8A6"/>
-                </a:solidFill>
-                <a:latin typeface="Courier New" panose="02070309020205020404" pitchFamily="49" charset="0"/>
-                <a:cs typeface="Courier New" panose="02070309020205020404" pitchFamily="49" charset="0"/>
-              </a:rPr>
-              <a:t>   </a:t>
-            </a:r>
-            <a:r>
-              <a:rPr lang="en-US" sz="1400" dirty="0">
-                <a:latin typeface="Courier New" panose="02070309020205020404" pitchFamily="49" charset="0"/>
-                <a:cs typeface="Courier New" panose="02070309020205020404" pitchFamily="49" charset="0"/>
-              </a:rPr>
-              <a:t>SelImmType;</a:t>
+                <a:latin typeface="Courier New" panose="02070309020205020404" pitchFamily="49" charset="0"/>
+                <a:cs typeface="Courier New" panose="02070309020205020404" pitchFamily="49" charset="0"/>
+              </a:rPr>
+              <a:t>SelAluPc</a:t>
+            </a:r>
+            <a:r>
+              <a:rPr lang="en-US" sz="1400" dirty="0">
+                <a:latin typeface="Courier New" panose="02070309020205020404" pitchFamily="49" charset="0"/>
+                <a:cs typeface="Courier New" panose="02070309020205020404" pitchFamily="49" charset="0"/>
+              </a:rPr>
+              <a:t> ;</a:t>
             </a:r>
           </a:p>
           <a:p>
@@ -15992,18 +16175,68 @@
                 <a:latin typeface="Courier New" panose="02070309020205020404" pitchFamily="49" charset="0"/>
                 <a:cs typeface="Courier New" panose="02070309020205020404" pitchFamily="49" charset="0"/>
               </a:rPr>
-              <a:t>         BranchCondMet;</a:t>
-            </a:r>
-          </a:p>
-          <a:p>
+              <a:t>         </a:t>
+            </a:r>
             <a:r>
               <a:rPr lang="en-US" sz="1400" dirty="0" err="1">
+                <a:latin typeface="Courier New" panose="02070309020205020404" pitchFamily="49" charset="0"/>
+                <a:cs typeface="Courier New" panose="02070309020205020404" pitchFamily="49" charset="0"/>
+              </a:rPr>
+              <a:t>SelAluImm</a:t>
+            </a:r>
+            <a:r>
+              <a:rPr lang="en-US" sz="1400" dirty="0">
+                <a:latin typeface="Courier New" panose="02070309020205020404" pitchFamily="49" charset="0"/>
+                <a:cs typeface="Courier New" panose="02070309020205020404" pitchFamily="49" charset="0"/>
+              </a:rPr>
+              <a:t>;</a:t>
+            </a:r>
+          </a:p>
+          <a:p>
+            <a:r>
+              <a:rPr lang="en-US" sz="1400" dirty="0" err="1">
                 <a:solidFill>
                   <a:srgbClr val="E6F8A6"/>
                 </a:solidFill>
                 <a:latin typeface="Courier New" panose="02070309020205020404" pitchFamily="49" charset="0"/>
                 <a:cs typeface="Courier New" panose="02070309020205020404" pitchFamily="49" charset="0"/>
               </a:rPr>
+              <a:t>t_immediate</a:t>
+            </a:r>
+            <a:r>
+              <a:rPr lang="en-US" sz="1400" dirty="0">
+                <a:solidFill>
+                  <a:srgbClr val="E6F8A6"/>
+                </a:solidFill>
+                <a:latin typeface="Courier New" panose="02070309020205020404" pitchFamily="49" charset="0"/>
+                <a:cs typeface="Courier New" panose="02070309020205020404" pitchFamily="49" charset="0"/>
+              </a:rPr>
+              <a:t>   </a:t>
+            </a:r>
+            <a:r>
+              <a:rPr lang="en-US" sz="1400" dirty="0" err="1">
+                <a:latin typeface="Courier New" panose="02070309020205020404" pitchFamily="49" charset="0"/>
+                <a:cs typeface="Courier New" panose="02070309020205020404" pitchFamily="49" charset="0"/>
+              </a:rPr>
+              <a:t>SelImmType</a:t>
+            </a:r>
+            <a:r>
+              <a:rPr lang="en-US" sz="1400" dirty="0">
+                <a:latin typeface="Courier New" panose="02070309020205020404" pitchFamily="49" charset="0"/>
+                <a:cs typeface="Courier New" panose="02070309020205020404" pitchFamily="49" charset="0"/>
+              </a:rPr>
+              <a:t>;</a:t>
+            </a:r>
+          </a:p>
+          <a:p>
+            <a:r>
+              <a:rPr lang="en-US" sz="1400" dirty="0" err="1">
+                <a:solidFill>
+                  <a:srgbClr val="E6F8A6"/>
+                </a:solidFill>
+                <a:latin typeface="Courier New" panose="02070309020205020404" pitchFamily="49" charset="0"/>
+                <a:cs typeface="Courier New" panose="02070309020205020404" pitchFamily="49" charset="0"/>
+              </a:rPr>
               <a:t>t_branch_type</a:t>
             </a:r>
             <a:r>
@@ -16017,11 +16250,18 @@
               <a:t> </a:t>
             </a:r>
             <a:r>
-              <a:rPr lang="en-US" sz="1400" dirty="0">
-                <a:latin typeface="Courier New" panose="02070309020205020404" pitchFamily="49" charset="0"/>
-                <a:cs typeface="Courier New" panose="02070309020205020404" pitchFamily="49" charset="0"/>
-              </a:rPr>
-              <a:t>CtrlBranchOp;</a:t>
+              <a:rPr lang="en-US" sz="1400" dirty="0" err="1">
+                <a:latin typeface="Courier New" panose="02070309020205020404" pitchFamily="49" charset="0"/>
+                <a:cs typeface="Courier New" panose="02070309020205020404" pitchFamily="49" charset="0"/>
+              </a:rPr>
+              <a:t>CtrlBranchOp</a:t>
+            </a:r>
+            <a:r>
+              <a:rPr lang="en-US" sz="1400" dirty="0">
+                <a:latin typeface="Courier New" panose="02070309020205020404" pitchFamily="49" charset="0"/>
+                <a:cs typeface="Courier New" panose="02070309020205020404" pitchFamily="49" charset="0"/>
+              </a:rPr>
+              <a:t>;</a:t>
             </a:r>
           </a:p>
           <a:p>
@@ -16043,7 +16283,21 @@
                 <a:latin typeface="Courier New" panose="02070309020205020404" pitchFamily="49" charset="0"/>
                 <a:cs typeface="Courier New" panose="02070309020205020404" pitchFamily="49" charset="0"/>
               </a:rPr>
-              <a:t> [3:0]   CtrlDMemByteEn;</a:t>
+              <a:t> [3:0]   </a:t>
+            </a:r>
+            <a:r>
+              <a:rPr lang="en-US" sz="1400" dirty="0" err="1">
+                <a:latin typeface="Courier New" panose="02070309020205020404" pitchFamily="49" charset="0"/>
+                <a:cs typeface="Courier New" panose="02070309020205020404" pitchFamily="49" charset="0"/>
+              </a:rPr>
+              <a:t>CtrlDMemByteEn</a:t>
+            </a:r>
+            <a:r>
+              <a:rPr lang="en-US" sz="1400" dirty="0">
+                <a:latin typeface="Courier New" panose="02070309020205020404" pitchFamily="49" charset="0"/>
+                <a:cs typeface="Courier New" panose="02070309020205020404" pitchFamily="49" charset="0"/>
+              </a:rPr>
+              <a:t>;</a:t>
             </a:r>
           </a:p>
           <a:p>
@@ -16065,12 +16319,62 @@
                 <a:latin typeface="Courier New" panose="02070309020205020404" pitchFamily="49" charset="0"/>
                 <a:cs typeface="Courier New" panose="02070309020205020404" pitchFamily="49" charset="0"/>
               </a:rPr>
-              <a:t>         CtrlDMemWrEn;</a:t>
-            </a:r>
-          </a:p>
-          <a:p>
+              <a:t>         </a:t>
+            </a:r>
             <a:r>
               <a:rPr lang="en-US" sz="1400" dirty="0" err="1">
+                <a:latin typeface="Courier New" panose="02070309020205020404" pitchFamily="49" charset="0"/>
+                <a:cs typeface="Courier New" panose="02070309020205020404" pitchFamily="49" charset="0"/>
+              </a:rPr>
+              <a:t>CtrlDMemWrEn</a:t>
+            </a:r>
+            <a:r>
+              <a:rPr lang="en-US" sz="1400" dirty="0">
+                <a:latin typeface="Courier New" panose="02070309020205020404" pitchFamily="49" charset="0"/>
+                <a:cs typeface="Courier New" panose="02070309020205020404" pitchFamily="49" charset="0"/>
+              </a:rPr>
+              <a:t>;</a:t>
+            </a:r>
+          </a:p>
+          <a:p>
+            <a:r>
+              <a:rPr lang="en-US" sz="1400" dirty="0">
+                <a:solidFill>
+                  <a:schemeClr val="bg2">
+                    <a:lumMod val="40000"/>
+                    <a:lumOff val="60000"/>
+                  </a:schemeClr>
+                </a:solidFill>
+                <a:latin typeface="Courier New" panose="02070309020205020404" pitchFamily="49" charset="0"/>
+                <a:cs typeface="Courier New" panose="02070309020205020404" pitchFamily="49" charset="0"/>
+              </a:rPr>
+              <a:t>logic</a:t>
+            </a:r>
+            <a:r>
+              <a:rPr lang="en-US" sz="1400" dirty="0">
+                <a:latin typeface="Courier New" panose="02070309020205020404" pitchFamily="49" charset="0"/>
+                <a:cs typeface="Courier New" panose="02070309020205020404" pitchFamily="49" charset="0"/>
+              </a:rPr>
+              <a:t>         </a:t>
+            </a:r>
+            <a:r>
+              <a:rPr lang="en-US" sz="1400" dirty="0" err="1">
+                <a:latin typeface="Courier New" panose="02070309020205020404" pitchFamily="49" charset="0"/>
+                <a:cs typeface="Courier New" panose="02070309020205020404" pitchFamily="49" charset="0"/>
+              </a:rPr>
+              <a:t>CtrlSignExt</a:t>
+            </a:r>
+            <a:r>
+              <a:rPr lang="en-US" sz="1400" dirty="0">
+                <a:latin typeface="Courier New" panose="02070309020205020404" pitchFamily="49" charset="0"/>
+                <a:cs typeface="Courier New" panose="02070309020205020404" pitchFamily="49" charset="0"/>
+              </a:rPr>
+              <a:t>;</a:t>
+            </a:r>
+          </a:p>
+          <a:p>
+            <a:r>
+              <a:rPr lang="en-US" sz="1400" dirty="0" err="1">
                 <a:solidFill>
                   <a:srgbClr val="E6F8A6"/>
                 </a:solidFill>
@@ -16090,11 +16394,18 @@
               <a:t>      </a:t>
             </a:r>
             <a:r>
-              <a:rPr lang="en-US" sz="1400" dirty="0">
-                <a:latin typeface="Courier New" panose="02070309020205020404" pitchFamily="49" charset="0"/>
-                <a:cs typeface="Courier New" panose="02070309020205020404" pitchFamily="49" charset="0"/>
-              </a:rPr>
-              <a:t>CtrlAluOp;</a:t>
+              <a:rPr lang="en-US" sz="1400" dirty="0" err="1">
+                <a:latin typeface="Courier New" panose="02070309020205020404" pitchFamily="49" charset="0"/>
+                <a:cs typeface="Courier New" panose="02070309020205020404" pitchFamily="49" charset="0"/>
+              </a:rPr>
+              <a:t>CtrlAluOp</a:t>
+            </a:r>
+            <a:r>
+              <a:rPr lang="en-US" sz="1400" dirty="0">
+                <a:latin typeface="Courier New" panose="02070309020205020404" pitchFamily="49" charset="0"/>
+                <a:cs typeface="Courier New" panose="02070309020205020404" pitchFamily="49" charset="0"/>
+              </a:rPr>
+              <a:t>;</a:t>
             </a:r>
           </a:p>
           <a:p>
@@ -16104,18 +16415,6 @@
             </a:endParaRPr>
           </a:p>
           <a:p>
-            <a:endParaRPr lang="en-US" sz="1400" dirty="0">
-              <a:latin typeface="Courier New" panose="02070309020205020404" pitchFamily="49" charset="0"/>
-              <a:cs typeface="Courier New" panose="02070309020205020404" pitchFamily="49" charset="0"/>
-            </a:endParaRPr>
-          </a:p>
-          <a:p>
-            <a:endParaRPr lang="en-US" sz="1400" dirty="0">
-              <a:latin typeface="Courier New" panose="02070309020205020404" pitchFamily="49" charset="0"/>
-              <a:cs typeface="Courier New" panose="02070309020205020404" pitchFamily="49" charset="0"/>
-            </a:endParaRPr>
-          </a:p>
-          <a:p>
             <a:r>
               <a:rPr lang="en-US" b="1" dirty="0">
                 <a:solidFill>
@@ -16239,14 +16538,43 @@
               <a:t>;</a:t>
             </a:r>
           </a:p>
-          <a:p>
-            <a:endParaRPr lang="en-US" sz="1400" dirty="0">
-              <a:latin typeface="Courier New" panose="02070309020205020404" pitchFamily="49" charset="0"/>
-              <a:cs typeface="Courier New" panose="02070309020205020404" pitchFamily="49" charset="0"/>
-            </a:endParaRPr>
-          </a:p>
         </p:txBody>
       </p:sp>
+      <p:pic>
+        <p:nvPicPr>
+          <p:cNvPr id="8" name="Content Placeholder 3">
+            <a:extLst>
+              <a:ext uri="{FF2B5EF4-FFF2-40B4-BE49-F238E27FC236}">
+                <a16:creationId xmlns:a16="http://schemas.microsoft.com/office/drawing/2014/main" id="{FEA7B9ED-577F-487F-8404-0BA081C41341}"/>
+              </a:ext>
+            </a:extLst>
+          </p:cNvPr>
+          <p:cNvPicPr>
+            <a:picLocks noChangeAspect="1"/>
+          </p:cNvPicPr>
+          <p:nvPr/>
+        </p:nvPicPr>
+        <p:blipFill>
+          <a:blip r:embed="rId2">
+            <a:extLst>
+              <a:ext uri="{28A0092B-C50C-407E-A947-70E740481C1C}">
+                <a14:useLocalDpi xmlns:a14="http://schemas.microsoft.com/office/drawing/2010/main" val="0"/>
+              </a:ext>
+            </a:extLst>
+          </a:blip>
+          <a:srcRect/>
+          <a:stretch/>
+        </p:blipFill>
+        <p:spPr>
+          <a:xfrm>
+            <a:off x="4727149" y="1269955"/>
+            <a:ext cx="7373412" cy="5462315"/>
+          </a:xfrm>
+          <a:prstGeom prst="rect">
+            <a:avLst/>
+          </a:prstGeom>
+        </p:spPr>
+      </p:pic>
     </p:spTree>
     <p:extLst>
       <p:ext uri="{BB962C8B-B14F-4D97-AF65-F5344CB8AC3E}">
@@ -17803,7 +18131,7 @@
         <p:spPr>
           <a:xfrm>
             <a:off x="206514" y="1913670"/>
-            <a:ext cx="4447298" cy="4739759"/>
+            <a:ext cx="4447298" cy="4185761"/>
           </a:xfrm>
           <a:prstGeom prst="rect">
             <a:avLst/>
@@ -17829,7 +18157,7 @@
           <a:lstStyle/>
           <a:p>
             <a:r>
-              <a:rPr lang="en-US" b="1" dirty="0">
+              <a:rPr lang="en-US" sz="1400" b="1" dirty="0">
                 <a:solidFill>
                   <a:schemeClr val="accent4">
                     <a:lumMod val="60000"/>
@@ -17861,7 +18189,21 @@
                 <a:latin typeface="Courier New" panose="02070309020205020404" pitchFamily="49" charset="0"/>
                 <a:cs typeface="Courier New" panose="02070309020205020404" pitchFamily="49" charset="0"/>
               </a:rPr>
-              <a:t>         SelNextPcAluOut;</a:t>
+              <a:t>         </a:t>
+            </a:r>
+            <a:r>
+              <a:rPr lang="en-US" sz="1400" dirty="0" err="1">
+                <a:latin typeface="Courier New" panose="02070309020205020404" pitchFamily="49" charset="0"/>
+                <a:cs typeface="Courier New" panose="02070309020205020404" pitchFamily="49" charset="0"/>
+              </a:rPr>
+              <a:t>SelNextPcAluOut</a:t>
+            </a:r>
+            <a:r>
+              <a:rPr lang="en-US" sz="1400" dirty="0">
+                <a:latin typeface="Courier New" panose="02070309020205020404" pitchFamily="49" charset="0"/>
+                <a:cs typeface="Courier New" panose="02070309020205020404" pitchFamily="49" charset="0"/>
+              </a:rPr>
+              <a:t>;</a:t>
             </a:r>
           </a:p>
           <a:p>
@@ -17883,7 +18225,21 @@
                 <a:latin typeface="Courier New" panose="02070309020205020404" pitchFamily="49" charset="0"/>
                 <a:cs typeface="Courier New" panose="02070309020205020404" pitchFamily="49" charset="0"/>
               </a:rPr>
-              <a:t>         SelRegWrPc; </a:t>
+              <a:t>         </a:t>
+            </a:r>
+            <a:r>
+              <a:rPr lang="en-US" sz="1400" dirty="0" err="1">
+                <a:latin typeface="Courier New" panose="02070309020205020404" pitchFamily="49" charset="0"/>
+                <a:cs typeface="Courier New" panose="02070309020205020404" pitchFamily="49" charset="0"/>
+              </a:rPr>
+              <a:t>SelRegWrPc</a:t>
+            </a:r>
+            <a:r>
+              <a:rPr lang="en-US" sz="1400" dirty="0">
+                <a:latin typeface="Courier New" panose="02070309020205020404" pitchFamily="49" charset="0"/>
+                <a:cs typeface="Courier New" panose="02070309020205020404" pitchFamily="49" charset="0"/>
+              </a:rPr>
+              <a:t>;</a:t>
             </a:r>
           </a:p>
           <a:p>
@@ -17905,7 +18261,21 @@
                 <a:latin typeface="Courier New" panose="02070309020205020404" pitchFamily="49" charset="0"/>
                 <a:cs typeface="Courier New" panose="02070309020205020404" pitchFamily="49" charset="0"/>
               </a:rPr>
-              <a:t>         SelDMemWb;</a:t>
+              <a:t>         </a:t>
+            </a:r>
+            <a:r>
+              <a:rPr lang="en-US" sz="1400" dirty="0" err="1">
+                <a:latin typeface="Courier New" panose="02070309020205020404" pitchFamily="49" charset="0"/>
+                <a:cs typeface="Courier New" panose="02070309020205020404" pitchFamily="49" charset="0"/>
+              </a:rPr>
+              <a:t>BranchCondMet</a:t>
+            </a:r>
+            <a:r>
+              <a:rPr lang="en-US" sz="1400" dirty="0">
+                <a:latin typeface="Courier New" panose="02070309020205020404" pitchFamily="49" charset="0"/>
+                <a:cs typeface="Courier New" panose="02070309020205020404" pitchFamily="49" charset="0"/>
+              </a:rPr>
+              <a:t>; </a:t>
             </a:r>
           </a:p>
           <a:p>
@@ -17927,7 +18297,21 @@
                 <a:latin typeface="Courier New" panose="02070309020205020404" pitchFamily="49" charset="0"/>
                 <a:cs typeface="Courier New" panose="02070309020205020404" pitchFamily="49" charset="0"/>
               </a:rPr>
-              <a:t>         SelAluPc ;</a:t>
+              <a:t>         </a:t>
+            </a:r>
+            <a:r>
+              <a:rPr lang="en-US" sz="1400" dirty="0" err="1">
+                <a:latin typeface="Courier New" panose="02070309020205020404" pitchFamily="49" charset="0"/>
+                <a:cs typeface="Courier New" panose="02070309020205020404" pitchFamily="49" charset="0"/>
+              </a:rPr>
+              <a:t>SelDMemWb</a:t>
+            </a:r>
+            <a:r>
+              <a:rPr lang="en-US" sz="1400" dirty="0">
+                <a:latin typeface="Courier New" panose="02070309020205020404" pitchFamily="49" charset="0"/>
+                <a:cs typeface="Courier New" panose="02070309020205020404" pitchFamily="49" charset="0"/>
+              </a:rPr>
+              <a:t>;</a:t>
             </a:r>
           </a:p>
           <a:p>
@@ -17949,36 +18333,21 @@
                 <a:latin typeface="Courier New" panose="02070309020205020404" pitchFamily="49" charset="0"/>
                 <a:cs typeface="Courier New" panose="02070309020205020404" pitchFamily="49" charset="0"/>
               </a:rPr>
-              <a:t>         SelAluImm;</a:t>
-            </a:r>
-          </a:p>
-          <a:p>
+              <a:t>         </a:t>
+            </a:r>
             <a:r>
               <a:rPr lang="en-US" sz="1400" dirty="0" err="1">
-                <a:solidFill>
-                  <a:srgbClr val="E6F8A6"/>
-                </a:solidFill>
-                <a:latin typeface="Courier New" panose="02070309020205020404" pitchFamily="49" charset="0"/>
-                <a:cs typeface="Courier New" panose="02070309020205020404" pitchFamily="49" charset="0"/>
-              </a:rPr>
-              <a:t>t_immediate</a:t>
-            </a:r>
-            <a:r>
-              <a:rPr lang="en-US" sz="1400" dirty="0">
-                <a:solidFill>
-                  <a:srgbClr val="E6F8A6"/>
-                </a:solidFill>
-                <a:latin typeface="Courier New" panose="02070309020205020404" pitchFamily="49" charset="0"/>
-                <a:cs typeface="Courier New" panose="02070309020205020404" pitchFamily="49" charset="0"/>
-              </a:rPr>
-              <a:t>   </a:t>
-            </a:r>
-            <a:r>
-              <a:rPr lang="en-US" sz="1400" dirty="0">
-                <a:latin typeface="Courier New" panose="02070309020205020404" pitchFamily="49" charset="0"/>
-                <a:cs typeface="Courier New" panose="02070309020205020404" pitchFamily="49" charset="0"/>
-              </a:rPr>
-              <a:t>SelImmType;</a:t>
+                <a:latin typeface="Courier New" panose="02070309020205020404" pitchFamily="49" charset="0"/>
+                <a:cs typeface="Courier New" panose="02070309020205020404" pitchFamily="49" charset="0"/>
+              </a:rPr>
+              <a:t>SelAluPc</a:t>
+            </a:r>
+            <a:r>
+              <a:rPr lang="en-US" sz="1400" dirty="0">
+                <a:latin typeface="Courier New" panose="02070309020205020404" pitchFamily="49" charset="0"/>
+                <a:cs typeface="Courier New" panose="02070309020205020404" pitchFamily="49" charset="0"/>
+              </a:rPr>
+              <a:t> ;</a:t>
             </a:r>
           </a:p>
           <a:p>
@@ -18000,18 +18369,68 @@
                 <a:latin typeface="Courier New" panose="02070309020205020404" pitchFamily="49" charset="0"/>
                 <a:cs typeface="Courier New" panose="02070309020205020404" pitchFamily="49" charset="0"/>
               </a:rPr>
-              <a:t>         BranchCondMet;</a:t>
-            </a:r>
-          </a:p>
-          <a:p>
+              <a:t>         </a:t>
+            </a:r>
             <a:r>
               <a:rPr lang="en-US" sz="1400" dirty="0" err="1">
+                <a:latin typeface="Courier New" panose="02070309020205020404" pitchFamily="49" charset="0"/>
+                <a:cs typeface="Courier New" panose="02070309020205020404" pitchFamily="49" charset="0"/>
+              </a:rPr>
+              <a:t>SelAluImm</a:t>
+            </a:r>
+            <a:r>
+              <a:rPr lang="en-US" sz="1400" dirty="0">
+                <a:latin typeface="Courier New" panose="02070309020205020404" pitchFamily="49" charset="0"/>
+                <a:cs typeface="Courier New" panose="02070309020205020404" pitchFamily="49" charset="0"/>
+              </a:rPr>
+              <a:t>;</a:t>
+            </a:r>
+          </a:p>
+          <a:p>
+            <a:r>
+              <a:rPr lang="en-US" sz="1400" dirty="0" err="1">
                 <a:solidFill>
                   <a:srgbClr val="E6F8A6"/>
                 </a:solidFill>
                 <a:latin typeface="Courier New" panose="02070309020205020404" pitchFamily="49" charset="0"/>
                 <a:cs typeface="Courier New" panose="02070309020205020404" pitchFamily="49" charset="0"/>
               </a:rPr>
+              <a:t>t_immediate</a:t>
+            </a:r>
+            <a:r>
+              <a:rPr lang="en-US" sz="1400" dirty="0">
+                <a:solidFill>
+                  <a:srgbClr val="E6F8A6"/>
+                </a:solidFill>
+                <a:latin typeface="Courier New" panose="02070309020205020404" pitchFamily="49" charset="0"/>
+                <a:cs typeface="Courier New" panose="02070309020205020404" pitchFamily="49" charset="0"/>
+              </a:rPr>
+              <a:t>   </a:t>
+            </a:r>
+            <a:r>
+              <a:rPr lang="en-US" sz="1400" dirty="0" err="1">
+                <a:latin typeface="Courier New" panose="02070309020205020404" pitchFamily="49" charset="0"/>
+                <a:cs typeface="Courier New" panose="02070309020205020404" pitchFamily="49" charset="0"/>
+              </a:rPr>
+              <a:t>SelImmType</a:t>
+            </a:r>
+            <a:r>
+              <a:rPr lang="en-US" sz="1400" dirty="0">
+                <a:latin typeface="Courier New" panose="02070309020205020404" pitchFamily="49" charset="0"/>
+                <a:cs typeface="Courier New" panose="02070309020205020404" pitchFamily="49" charset="0"/>
+              </a:rPr>
+              <a:t>;</a:t>
+            </a:r>
+          </a:p>
+          <a:p>
+            <a:r>
+              <a:rPr lang="en-US" sz="1400" dirty="0" err="1">
+                <a:solidFill>
+                  <a:srgbClr val="E6F8A6"/>
+                </a:solidFill>
+                <a:latin typeface="Courier New" panose="02070309020205020404" pitchFamily="49" charset="0"/>
+                <a:cs typeface="Courier New" panose="02070309020205020404" pitchFamily="49" charset="0"/>
+              </a:rPr>
               <a:t>t_branch_type</a:t>
             </a:r>
             <a:r>
@@ -18025,11 +18444,18 @@
               <a:t> </a:t>
             </a:r>
             <a:r>
-              <a:rPr lang="en-US" sz="1400" dirty="0">
-                <a:latin typeface="Courier New" panose="02070309020205020404" pitchFamily="49" charset="0"/>
-                <a:cs typeface="Courier New" panose="02070309020205020404" pitchFamily="49" charset="0"/>
-              </a:rPr>
-              <a:t>CtrlBranchOp;</a:t>
+              <a:rPr lang="en-US" sz="1400" dirty="0" err="1">
+                <a:latin typeface="Courier New" panose="02070309020205020404" pitchFamily="49" charset="0"/>
+                <a:cs typeface="Courier New" panose="02070309020205020404" pitchFamily="49" charset="0"/>
+              </a:rPr>
+              <a:t>CtrlBranchOp</a:t>
+            </a:r>
+            <a:r>
+              <a:rPr lang="en-US" sz="1400" dirty="0">
+                <a:latin typeface="Courier New" panose="02070309020205020404" pitchFamily="49" charset="0"/>
+                <a:cs typeface="Courier New" panose="02070309020205020404" pitchFamily="49" charset="0"/>
+              </a:rPr>
+              <a:t>;</a:t>
             </a:r>
           </a:p>
           <a:p>
@@ -18051,7 +18477,21 @@
                 <a:latin typeface="Courier New" panose="02070309020205020404" pitchFamily="49" charset="0"/>
                 <a:cs typeface="Courier New" panose="02070309020205020404" pitchFamily="49" charset="0"/>
               </a:rPr>
-              <a:t> [3:0]   CtrlDMemByteEn;</a:t>
+              <a:t> [3:0]   </a:t>
+            </a:r>
+            <a:r>
+              <a:rPr lang="en-US" sz="1400" dirty="0" err="1">
+                <a:latin typeface="Courier New" panose="02070309020205020404" pitchFamily="49" charset="0"/>
+                <a:cs typeface="Courier New" panose="02070309020205020404" pitchFamily="49" charset="0"/>
+              </a:rPr>
+              <a:t>CtrlDMemByteEn</a:t>
+            </a:r>
+            <a:r>
+              <a:rPr lang="en-US" sz="1400" dirty="0">
+                <a:latin typeface="Courier New" panose="02070309020205020404" pitchFamily="49" charset="0"/>
+                <a:cs typeface="Courier New" panose="02070309020205020404" pitchFamily="49" charset="0"/>
+              </a:rPr>
+              <a:t>;</a:t>
             </a:r>
           </a:p>
           <a:p>
@@ -18073,12 +18513,62 @@
                 <a:latin typeface="Courier New" panose="02070309020205020404" pitchFamily="49" charset="0"/>
                 <a:cs typeface="Courier New" panose="02070309020205020404" pitchFamily="49" charset="0"/>
               </a:rPr>
-              <a:t>         CtrlDMemWrEn;</a:t>
-            </a:r>
-          </a:p>
-          <a:p>
+              <a:t>         </a:t>
+            </a:r>
             <a:r>
               <a:rPr lang="en-US" sz="1400" dirty="0" err="1">
+                <a:latin typeface="Courier New" panose="02070309020205020404" pitchFamily="49" charset="0"/>
+                <a:cs typeface="Courier New" panose="02070309020205020404" pitchFamily="49" charset="0"/>
+              </a:rPr>
+              <a:t>CtrlDMemWrEn</a:t>
+            </a:r>
+            <a:r>
+              <a:rPr lang="en-US" sz="1400" dirty="0">
+                <a:latin typeface="Courier New" panose="02070309020205020404" pitchFamily="49" charset="0"/>
+                <a:cs typeface="Courier New" panose="02070309020205020404" pitchFamily="49" charset="0"/>
+              </a:rPr>
+              <a:t>;</a:t>
+            </a:r>
+          </a:p>
+          <a:p>
+            <a:r>
+              <a:rPr lang="en-US" sz="1400" dirty="0">
+                <a:solidFill>
+                  <a:schemeClr val="bg2">
+                    <a:lumMod val="40000"/>
+                    <a:lumOff val="60000"/>
+                  </a:schemeClr>
+                </a:solidFill>
+                <a:latin typeface="Courier New" panose="02070309020205020404" pitchFamily="49" charset="0"/>
+                <a:cs typeface="Courier New" panose="02070309020205020404" pitchFamily="49" charset="0"/>
+              </a:rPr>
+              <a:t>logic</a:t>
+            </a:r>
+            <a:r>
+              <a:rPr lang="en-US" sz="1400" dirty="0">
+                <a:latin typeface="Courier New" panose="02070309020205020404" pitchFamily="49" charset="0"/>
+                <a:cs typeface="Courier New" panose="02070309020205020404" pitchFamily="49" charset="0"/>
+              </a:rPr>
+              <a:t>         </a:t>
+            </a:r>
+            <a:r>
+              <a:rPr lang="en-US" sz="1400" dirty="0" err="1">
+                <a:latin typeface="Courier New" panose="02070309020205020404" pitchFamily="49" charset="0"/>
+                <a:cs typeface="Courier New" panose="02070309020205020404" pitchFamily="49" charset="0"/>
+              </a:rPr>
+              <a:t>CtrlSignExt</a:t>
+            </a:r>
+            <a:r>
+              <a:rPr lang="en-US" sz="1400" dirty="0">
+                <a:latin typeface="Courier New" panose="02070309020205020404" pitchFamily="49" charset="0"/>
+                <a:cs typeface="Courier New" panose="02070309020205020404" pitchFamily="49" charset="0"/>
+              </a:rPr>
+              <a:t>;</a:t>
+            </a:r>
+          </a:p>
+          <a:p>
+            <a:r>
+              <a:rPr lang="en-US" sz="1400" dirty="0" err="1">
                 <a:solidFill>
                   <a:srgbClr val="E6F8A6"/>
                 </a:solidFill>
@@ -18098,11 +18588,18 @@
               <a:t>      </a:t>
             </a:r>
             <a:r>
-              <a:rPr lang="en-US" sz="1400" dirty="0">
-                <a:latin typeface="Courier New" panose="02070309020205020404" pitchFamily="49" charset="0"/>
-                <a:cs typeface="Courier New" panose="02070309020205020404" pitchFamily="49" charset="0"/>
-              </a:rPr>
-              <a:t>CtrlAluOp;</a:t>
+              <a:rPr lang="en-US" sz="1400" dirty="0" err="1">
+                <a:latin typeface="Courier New" panose="02070309020205020404" pitchFamily="49" charset="0"/>
+                <a:cs typeface="Courier New" panose="02070309020205020404" pitchFamily="49" charset="0"/>
+              </a:rPr>
+              <a:t>CtrlAluOp</a:t>
+            </a:r>
+            <a:r>
+              <a:rPr lang="en-US" sz="1400" dirty="0">
+                <a:latin typeface="Courier New" panose="02070309020205020404" pitchFamily="49" charset="0"/>
+                <a:cs typeface="Courier New" panose="02070309020205020404" pitchFamily="49" charset="0"/>
+              </a:rPr>
+              <a:t>;</a:t>
             </a:r>
           </a:p>
           <a:p>
@@ -18112,20 +18609,8 @@
             </a:endParaRPr>
           </a:p>
           <a:p>
-            <a:endParaRPr lang="en-US" sz="1400" dirty="0">
-              <a:latin typeface="Courier New" panose="02070309020205020404" pitchFamily="49" charset="0"/>
-              <a:cs typeface="Courier New" panose="02070309020205020404" pitchFamily="49" charset="0"/>
-            </a:endParaRPr>
-          </a:p>
-          <a:p>
-            <a:endParaRPr lang="en-US" sz="1400" dirty="0">
-              <a:latin typeface="Courier New" panose="02070309020205020404" pitchFamily="49" charset="0"/>
-              <a:cs typeface="Courier New" panose="02070309020205020404" pitchFamily="49" charset="0"/>
-            </a:endParaRPr>
-          </a:p>
-          <a:p>
-            <a:r>
-              <a:rPr lang="en-US" b="1" dirty="0">
+            <a:r>
+              <a:rPr lang="en-US" sz="1400" b="1" dirty="0">
                 <a:solidFill>
                   <a:schemeClr val="accent4">
                     <a:lumMod val="60000"/>
@@ -18246,12 +18731,6 @@
               </a:rPr>
               <a:t>;</a:t>
             </a:r>
-          </a:p>
-          <a:p>
-            <a:endParaRPr lang="en-US" sz="1400" dirty="0">
-              <a:latin typeface="Courier New" panose="02070309020205020404" pitchFamily="49" charset="0"/>
-              <a:cs typeface="Courier New" panose="02070309020205020404" pitchFamily="49" charset="0"/>
-            </a:endParaRPr>
           </a:p>
         </p:txBody>
       </p:sp>
@@ -22046,8 +22525,8 @@
         </p:nvSpPr>
         <p:spPr>
           <a:xfrm>
-            <a:off x="646111" y="1203858"/>
-            <a:ext cx="5770731" cy="5201424"/>
+            <a:off x="420081" y="1203858"/>
+            <a:ext cx="3566293" cy="5693866"/>
           </a:xfrm>
           <a:prstGeom prst="rect">
             <a:avLst/>
@@ -22083,7 +22562,7 @@
                 <a:latin typeface="Courier New" panose="02070309020205020404" pitchFamily="49" charset="0"/>
                 <a:cs typeface="Courier New" panose="02070309020205020404" pitchFamily="49" charset="0"/>
               </a:rPr>
-              <a:t>|   LICENSE</a:t>
+              <a:t>|    buildl.sh</a:t>
             </a:r>
           </a:p>
           <a:p>
@@ -22098,12 +22577,10 @@
                 <a:latin typeface="Courier New" panose="02070309020205020404" pitchFamily="49" charset="0"/>
                 <a:cs typeface="Courier New" panose="02070309020205020404" pitchFamily="49" charset="0"/>
               </a:rPr>
-              <a:t>|   README.md</a:t>
-            </a:r>
-          </a:p>
-          <a:p>
-            <a:r>
-              <a:rPr lang="en-US" sz="1600" b="1" dirty="0">
+              <a:t>|    .</a:t>
+            </a:r>
+            <a:r>
+              <a:rPr lang="en-US" sz="1400" dirty="0" err="1">
                 <a:solidFill>
                   <a:schemeClr val="accent2">
                     <a:lumMod val="20000"/>
@@ -22113,48 +22590,7 @@
                 <a:latin typeface="Courier New" panose="02070309020205020404" pitchFamily="49" charset="0"/>
                 <a:cs typeface="Courier New" panose="02070309020205020404" pitchFamily="49" charset="0"/>
               </a:rPr>
-              <a:t>+---</a:t>
-            </a:r>
-            <a:r>
-              <a:rPr lang="en-US" sz="1600" b="1" i="1" u="sng" dirty="0">
-                <a:solidFill>
-                  <a:schemeClr val="accent2">
-                    <a:lumMod val="20000"/>
-                    <a:lumOff val="80000"/>
-                  </a:schemeClr>
-                </a:solidFill>
-                <a:latin typeface="Courier New" panose="02070309020205020404" pitchFamily="49" charset="0"/>
-                <a:cs typeface="Courier New" panose="02070309020205020404" pitchFamily="49" charset="0"/>
-              </a:rPr>
-              <a:t>apps</a:t>
-            </a:r>
-          </a:p>
-          <a:p>
-            <a:r>
-              <a:rPr lang="en-US" sz="1400" dirty="0">
-                <a:solidFill>
-                  <a:schemeClr val="accent2">
-                    <a:lumMod val="20000"/>
-                    <a:lumOff val="80000"/>
-                  </a:schemeClr>
-                </a:solidFill>
-                <a:latin typeface="Courier New" panose="02070309020205020404" pitchFamily="49" charset="0"/>
-                <a:cs typeface="Courier New" panose="02070309020205020404" pitchFamily="49" charset="0"/>
-              </a:rPr>
-              <a:t>|       </a:t>
-            </a:r>
-            <a:r>
-              <a:rPr lang="en-US" sz="1400" dirty="0" err="1">
-                <a:solidFill>
-                  <a:schemeClr val="accent2">
-                    <a:lumMod val="20000"/>
-                    <a:lumOff val="80000"/>
-                  </a:schemeClr>
-                </a:solidFill>
-                <a:latin typeface="Courier New" panose="02070309020205020404" pitchFamily="49" charset="0"/>
-                <a:cs typeface="Courier New" panose="02070309020205020404" pitchFamily="49" charset="0"/>
-              </a:rPr>
-              <a:t>alive_asap.s</a:t>
+              <a:t>gitignore</a:t>
             </a:r>
             <a:endParaRPr lang="en-US" sz="1400" dirty="0">
               <a:solidFill>
@@ -22179,7 +22615,7 @@
                 <a:latin typeface="Courier New" panose="02070309020205020404" pitchFamily="49" charset="0"/>
                 <a:cs typeface="Courier New" panose="02070309020205020404" pitchFamily="49" charset="0"/>
               </a:rPr>
-              <a:t>|       crt0.s</a:t>
+              <a:t>|    LICENSE</a:t>
             </a:r>
           </a:p>
           <a:p>
@@ -22194,10 +22630,22 @@
                 <a:latin typeface="Courier New" panose="02070309020205020404" pitchFamily="49" charset="0"/>
                 <a:cs typeface="Courier New" panose="02070309020205020404" pitchFamily="49" charset="0"/>
               </a:rPr>
-              <a:t>|       </a:t>
-            </a:r>
-            <a:r>
-              <a:rPr lang="en-US" sz="1400" dirty="0" err="1">
+              <a:t>|    README.md</a:t>
+            </a:r>
+            <a:endParaRPr lang="en-US" sz="1400" b="1" dirty="0">
+              <a:solidFill>
+                <a:schemeClr val="accent2">
+                  <a:lumMod val="20000"/>
+                  <a:lumOff val="80000"/>
+                </a:schemeClr>
+              </a:solidFill>
+              <a:latin typeface="Courier New" panose="02070309020205020404" pitchFamily="49" charset="0"/>
+              <a:cs typeface="Courier New" panose="02070309020205020404" pitchFamily="49" charset="0"/>
+            </a:endParaRPr>
+          </a:p>
+          <a:p>
+            <a:r>
+              <a:rPr lang="en-US" sz="1600" b="1" dirty="0">
                 <a:solidFill>
                   <a:schemeClr val="accent2">
                     <a:lumMod val="20000"/>
@@ -22207,7 +22655,48 @@
                 <a:latin typeface="Courier New" panose="02070309020205020404" pitchFamily="49" charset="0"/>
                 <a:cs typeface="Courier New" panose="02070309020205020404" pitchFamily="49" charset="0"/>
               </a:rPr>
-              <a:t>link.common.ld</a:t>
+              <a:t>+---</a:t>
+            </a:r>
+            <a:r>
+              <a:rPr lang="en-US" sz="1600" b="1" i="1" u="sng" dirty="0">
+                <a:solidFill>
+                  <a:schemeClr val="accent2">
+                    <a:lumMod val="20000"/>
+                    <a:lumOff val="80000"/>
+                  </a:schemeClr>
+                </a:solidFill>
+                <a:latin typeface="Courier New" panose="02070309020205020404" pitchFamily="49" charset="0"/>
+                <a:cs typeface="Courier New" panose="02070309020205020404" pitchFamily="49" charset="0"/>
+              </a:rPr>
+              <a:t>apps</a:t>
+            </a:r>
+          </a:p>
+          <a:p>
+            <a:r>
+              <a:rPr lang="en-US" sz="1400" dirty="0">
+                <a:solidFill>
+                  <a:schemeClr val="accent2">
+                    <a:lumMod val="20000"/>
+                    <a:lumOff val="80000"/>
+                  </a:schemeClr>
+                </a:solidFill>
+                <a:latin typeface="Courier New" panose="02070309020205020404" pitchFamily="49" charset="0"/>
+                <a:cs typeface="Courier New" panose="02070309020205020404" pitchFamily="49" charset="0"/>
+              </a:rPr>
+              <a:t>|       +---</a:t>
+            </a:r>
+            <a:r>
+              <a:rPr lang="en-US" sz="1400" dirty="0" err="1">
+                <a:solidFill>
+                  <a:schemeClr val="accent2">
+                    <a:lumMod val="20000"/>
+                    <a:lumOff val="80000"/>
+                  </a:schemeClr>
+                </a:solidFill>
+                <a:latin typeface="Courier New" panose="02070309020205020404" pitchFamily="49" charset="0"/>
+                <a:cs typeface="Courier New" panose="02070309020205020404" pitchFamily="49" charset="0"/>
+              </a:rPr>
+              <a:t>asm</a:t>
             </a:r>
             <a:endParaRPr lang="en-US" sz="1400" dirty="0">
               <a:solidFill>
@@ -22232,12 +22721,12 @@
                 <a:latin typeface="Courier New" panose="02070309020205020404" pitchFamily="49" charset="0"/>
                 <a:cs typeface="Courier New" panose="02070309020205020404" pitchFamily="49" charset="0"/>
               </a:rPr>
-              <a:t>|       README.md</a:t>
-            </a:r>
-          </a:p>
-          <a:p>
-            <a:r>
-              <a:rPr lang="en-US" sz="1600" b="1" dirty="0">
+              <a:t>|       +---C</a:t>
+            </a:r>
+          </a:p>
+          <a:p>
+            <a:r>
+              <a:rPr lang="en-US" sz="1400" dirty="0">
                 <a:solidFill>
                   <a:schemeClr val="accent2">
                     <a:lumMod val="20000"/>
@@ -22247,10 +22736,12 @@
                 <a:latin typeface="Courier New" panose="02070309020205020404" pitchFamily="49" charset="0"/>
                 <a:cs typeface="Courier New" panose="02070309020205020404" pitchFamily="49" charset="0"/>
               </a:rPr>
-              <a:t>+---</a:t>
-            </a:r>
-            <a:r>
-              <a:rPr lang="en-US" sz="1600" b="1" i="1" u="sng" dirty="0">
+              <a:t>|       +---elf</a:t>
+            </a:r>
+          </a:p>
+          <a:p>
+            <a:r>
+              <a:rPr lang="en-US" sz="1400" dirty="0">
                 <a:solidFill>
                   <a:schemeClr val="accent2">
                     <a:lumMod val="20000"/>
@@ -22260,7 +22751,7 @@
                 <a:latin typeface="Courier New" panose="02070309020205020404" pitchFamily="49" charset="0"/>
                 <a:cs typeface="Courier New" panose="02070309020205020404" pitchFamily="49" charset="0"/>
               </a:rPr>
-              <a:t>doc</a:t>
+              <a:t>|       +---elf.txt</a:t>
             </a:r>
           </a:p>
           <a:p>
@@ -22275,7 +22766,186 @@
                 <a:latin typeface="Courier New" panose="02070309020205020404" pitchFamily="49" charset="0"/>
                 <a:cs typeface="Courier New" panose="02070309020205020404" pitchFamily="49" charset="0"/>
               </a:rPr>
+              <a:t>|       +---</a:t>
+            </a:r>
+            <a:r>
+              <a:rPr lang="en-US" sz="1400" dirty="0" err="1">
+                <a:solidFill>
+                  <a:schemeClr val="accent2">
+                    <a:lumMod val="20000"/>
+                    <a:lumOff val="80000"/>
+                  </a:schemeClr>
+                </a:solidFill>
+                <a:latin typeface="Courier New" panose="02070309020205020404" pitchFamily="49" charset="0"/>
+                <a:cs typeface="Courier New" panose="02070309020205020404" pitchFamily="49" charset="0"/>
+              </a:rPr>
+              <a:t>sv</a:t>
+            </a:r>
+            <a:endParaRPr lang="en-US" sz="1400" dirty="0">
+              <a:solidFill>
+                <a:schemeClr val="accent2">
+                  <a:lumMod val="20000"/>
+                  <a:lumOff val="80000"/>
+                </a:schemeClr>
+              </a:solidFill>
+              <a:latin typeface="Courier New" panose="02070309020205020404" pitchFamily="49" charset="0"/>
+              <a:cs typeface="Courier New" panose="02070309020205020404" pitchFamily="49" charset="0"/>
+            </a:endParaRPr>
+          </a:p>
+          <a:p>
+            <a:r>
+              <a:rPr lang="en-US" sz="1400" dirty="0">
+                <a:solidFill>
+                  <a:schemeClr val="accent2">
+                    <a:lumMod val="20000"/>
+                    <a:lumOff val="80000"/>
+                  </a:schemeClr>
+                </a:solidFill>
+                <a:latin typeface="Courier New" panose="02070309020205020404" pitchFamily="49" charset="0"/>
+                <a:cs typeface="Courier New" panose="02070309020205020404" pitchFamily="49" charset="0"/>
+              </a:rPr>
+              <a:t>|       crt0.s</a:t>
+            </a:r>
+          </a:p>
+          <a:p>
+            <a:r>
+              <a:rPr lang="en-US" sz="1400" dirty="0">
+                <a:solidFill>
+                  <a:schemeClr val="accent2">
+                    <a:lumMod val="20000"/>
+                    <a:lumOff val="80000"/>
+                  </a:schemeClr>
+                </a:solidFill>
+                <a:latin typeface="Courier New" panose="02070309020205020404" pitchFamily="49" charset="0"/>
+                <a:cs typeface="Courier New" panose="02070309020205020404" pitchFamily="49" charset="0"/>
+              </a:rPr>
+              <a:t>|       </a:t>
+            </a:r>
+            <a:r>
+              <a:rPr lang="en-US" sz="1400" dirty="0" err="1">
+                <a:solidFill>
+                  <a:schemeClr val="accent2">
+                    <a:lumMod val="20000"/>
+                    <a:lumOff val="80000"/>
+                  </a:schemeClr>
+                </a:solidFill>
+                <a:latin typeface="Courier New" panose="02070309020205020404" pitchFamily="49" charset="0"/>
+                <a:cs typeface="Courier New" panose="02070309020205020404" pitchFamily="49" charset="0"/>
+              </a:rPr>
+              <a:t>link.common.ld</a:t>
+            </a:r>
+            <a:endParaRPr lang="en-US" sz="1400" dirty="0">
+              <a:solidFill>
+                <a:schemeClr val="accent2">
+                  <a:lumMod val="20000"/>
+                  <a:lumOff val="80000"/>
+                </a:schemeClr>
+              </a:solidFill>
+              <a:latin typeface="Courier New" panose="02070309020205020404" pitchFamily="49" charset="0"/>
+              <a:cs typeface="Courier New" panose="02070309020205020404" pitchFamily="49" charset="0"/>
+            </a:endParaRPr>
+          </a:p>
+          <a:p>
+            <a:r>
+              <a:rPr lang="en-US" sz="1400" dirty="0">
+                <a:solidFill>
+                  <a:schemeClr val="accent2">
+                    <a:lumMod val="20000"/>
+                    <a:lumOff val="80000"/>
+                  </a:schemeClr>
+                </a:solidFill>
+                <a:latin typeface="Courier New" panose="02070309020205020404" pitchFamily="49" charset="0"/>
+                <a:cs typeface="Courier New" panose="02070309020205020404" pitchFamily="49" charset="0"/>
+              </a:rPr>
+              <a:t>|       README.md</a:t>
+            </a:r>
+          </a:p>
+          <a:p>
+            <a:r>
+              <a:rPr lang="en-US" sz="1600" b="1" dirty="0">
+                <a:solidFill>
+                  <a:schemeClr val="accent2">
+                    <a:lumMod val="20000"/>
+                    <a:lumOff val="80000"/>
+                  </a:schemeClr>
+                </a:solidFill>
+                <a:latin typeface="Courier New" panose="02070309020205020404" pitchFamily="49" charset="0"/>
+                <a:cs typeface="Courier New" panose="02070309020205020404" pitchFamily="49" charset="0"/>
+              </a:rPr>
+              <a:t>+---</a:t>
+            </a:r>
+            <a:r>
+              <a:rPr lang="en-US" sz="1600" b="1" i="1" u="sng" dirty="0">
+                <a:solidFill>
+                  <a:schemeClr val="accent2">
+                    <a:lumMod val="20000"/>
+                    <a:lumOff val="80000"/>
+                  </a:schemeClr>
+                </a:solidFill>
+                <a:latin typeface="Courier New" panose="02070309020205020404" pitchFamily="49" charset="0"/>
+                <a:cs typeface="Courier New" panose="02070309020205020404" pitchFamily="49" charset="0"/>
+              </a:rPr>
+              <a:t>doc</a:t>
+            </a:r>
+          </a:p>
+          <a:p>
+            <a:r>
+              <a:rPr lang="en-US" sz="1400" dirty="0">
+                <a:solidFill>
+                  <a:schemeClr val="accent2">
+                    <a:lumMod val="20000"/>
+                    <a:lumOff val="80000"/>
+                  </a:schemeClr>
+                </a:solidFill>
+                <a:latin typeface="Courier New" panose="02070309020205020404" pitchFamily="49" charset="0"/>
+                <a:cs typeface="Courier New" panose="02070309020205020404" pitchFamily="49" charset="0"/>
+              </a:rPr>
               <a:t>|       HOW_TO.md</a:t>
+            </a:r>
+          </a:p>
+          <a:p>
+            <a:r>
+              <a:rPr lang="en-US" sz="1400" dirty="0">
+                <a:solidFill>
+                  <a:schemeClr val="accent2">
+                    <a:lumMod val="20000"/>
+                    <a:lumOff val="80000"/>
+                  </a:schemeClr>
+                </a:solidFill>
+                <a:latin typeface="Courier New" panose="02070309020205020404" pitchFamily="49" charset="0"/>
+                <a:cs typeface="Courier New" panose="02070309020205020404" pitchFamily="49" charset="0"/>
+              </a:rPr>
+              <a:t>|       5 stage pipeline.pptx</a:t>
+            </a:r>
+          </a:p>
+          <a:p>
+            <a:r>
+              <a:rPr lang="en-US" sz="1400" dirty="0">
+                <a:solidFill>
+                  <a:schemeClr val="accent2">
+                    <a:lumMod val="20000"/>
+                    <a:lumOff val="80000"/>
+                  </a:schemeClr>
+                </a:solidFill>
+                <a:latin typeface="Courier New" panose="02070309020205020404" pitchFamily="49" charset="0"/>
+                <a:cs typeface="Courier New" panose="02070309020205020404" pitchFamily="49" charset="0"/>
+              </a:rPr>
+              <a:t>|       HOW_TO_RUN_BUILDL.md</a:t>
+            </a:r>
+          </a:p>
+          <a:p>
+            <a:r>
+              <a:rPr lang="en-US" sz="1400" dirty="0">
+                <a:solidFill>
+                  <a:schemeClr val="accent2">
+                    <a:lumMod val="20000"/>
+                    <a:lumOff val="80000"/>
+                  </a:schemeClr>
+                </a:solidFill>
+                <a:latin typeface="Courier New" panose="02070309020205020404" pitchFamily="49" charset="0"/>
+                <a:cs typeface="Courier New" panose="02070309020205020404" pitchFamily="49" charset="0"/>
+              </a:rPr>
+              <a:t>|       HOW_TO_GIT.md</a:t>
             </a:r>
           </a:p>
           <a:p>
@@ -22416,7 +23086,7 @@
           </a:p>
           <a:p>
             <a:r>
-              <a:rPr lang="en-US" sz="1600" b="1" dirty="0">
+              <a:rPr lang="en-US" sz="1400" dirty="0">
                 <a:solidFill>
                   <a:schemeClr val="accent2">
                     <a:lumMod val="20000"/>
@@ -22426,10 +23096,53 @@
                 <a:latin typeface="Courier New" panose="02070309020205020404" pitchFamily="49" charset="0"/>
                 <a:cs typeface="Courier New" panose="02070309020205020404" pitchFamily="49" charset="0"/>
               </a:rPr>
-              <a:t>+---</a:t>
-            </a:r>
-            <a:r>
-              <a:rPr lang="en-US" sz="1600" b="1" i="1" u="sng" dirty="0">
+              <a:t>|       +---work</a:t>
+            </a:r>
+          </a:p>
+        </p:txBody>
+      </p:sp>
+      <p:sp>
+        <p:nvSpPr>
+          <p:cNvPr id="4" name="Rectangle 6">
+            <a:extLst>
+              <a:ext uri="{FF2B5EF4-FFF2-40B4-BE49-F238E27FC236}">
+                <a16:creationId xmlns:a16="http://schemas.microsoft.com/office/drawing/2014/main" id="{CC297713-FD2A-4D06-8379-E16858FDA5EF}"/>
+              </a:ext>
+            </a:extLst>
+          </p:cNvPr>
+          <p:cNvSpPr/>
+          <p:nvPr/>
+        </p:nvSpPr>
+        <p:spPr>
+          <a:xfrm>
+            <a:off x="4228373" y="1203927"/>
+            <a:ext cx="3566293" cy="4278094"/>
+          </a:xfrm>
+          <a:prstGeom prst="rect">
+            <a:avLst/>
+          </a:prstGeom>
+          <a:solidFill>
+            <a:schemeClr val="bg1">
+              <a:lumMod val="85000"/>
+              <a:lumOff val="15000"/>
+            </a:schemeClr>
+          </a:solidFill>
+          <a:ln>
+            <a:solidFill>
+              <a:schemeClr val="tx1">
+                <a:lumMod val="65000"/>
+              </a:schemeClr>
+            </a:solidFill>
+          </a:ln>
+        </p:spPr>
+        <p:txBody>
+          <a:bodyPr wrap="square">
+            <a:spAutoFit/>
+          </a:bodyPr>
+          <a:lstStyle/>
+          <a:p>
+            <a:r>
+              <a:rPr lang="en-US" sz="1600" b="1" dirty="0">
                 <a:solidFill>
                   <a:schemeClr val="accent2">
                     <a:lumMod val="20000"/>
@@ -22439,12 +23152,10 @@
                 <a:latin typeface="Courier New" panose="02070309020205020404" pitchFamily="49" charset="0"/>
                 <a:cs typeface="Courier New" panose="02070309020205020404" pitchFamily="49" charset="0"/>
               </a:rPr>
-              <a:t>source</a:t>
-            </a:r>
-          </a:p>
-          <a:p>
-            <a:r>
-              <a:rPr lang="en-US" sz="1400" dirty="0">
+              <a:t>+---</a:t>
+            </a:r>
+            <a:r>
+              <a:rPr lang="en-US" sz="1600" b="1" i="1" u="sng" dirty="0">
                 <a:solidFill>
                   <a:schemeClr val="accent2">
                     <a:lumMod val="20000"/>
@@ -22454,7 +23165,7 @@
                 <a:latin typeface="Courier New" panose="02070309020205020404" pitchFamily="49" charset="0"/>
                 <a:cs typeface="Courier New" panose="02070309020205020404" pitchFamily="49" charset="0"/>
               </a:rPr>
-              <a:t>|       README.md</a:t>
+              <a:t>source</a:t>
             </a:r>
           </a:p>
           <a:p>
@@ -22469,7 +23180,7 @@
                 <a:latin typeface="Courier New" panose="02070309020205020404" pitchFamily="49" charset="0"/>
                 <a:cs typeface="Courier New" panose="02070309020205020404" pitchFamily="49" charset="0"/>
               </a:rPr>
-              <a:t>|       rvc_asap.sv</a:t>
+              <a:t>|       README.md</a:t>
             </a:r>
           </a:p>
           <a:p>
@@ -22484,7 +23195,7 @@
                 <a:latin typeface="Courier New" panose="02070309020205020404" pitchFamily="49" charset="0"/>
                 <a:cs typeface="Courier New" panose="02070309020205020404" pitchFamily="49" charset="0"/>
               </a:rPr>
-              <a:t>|       rvc_asap_macros.sv</a:t>
+              <a:t>|       rvc_asap.sv</a:t>
             </a:r>
           </a:p>
           <a:p>
@@ -22499,8 +23210,255 @@
                 <a:latin typeface="Courier New" panose="02070309020205020404" pitchFamily="49" charset="0"/>
                 <a:cs typeface="Courier New" panose="02070309020205020404" pitchFamily="49" charset="0"/>
               </a:rPr>
+              <a:t>|       rvc_asap_macros.sv</a:t>
+            </a:r>
+          </a:p>
+          <a:p>
+            <a:r>
+              <a:rPr lang="en-US" sz="1400" dirty="0">
+                <a:solidFill>
+                  <a:schemeClr val="accent2">
+                    <a:lumMod val="20000"/>
+                    <a:lumOff val="80000"/>
+                  </a:schemeClr>
+                </a:solidFill>
+                <a:latin typeface="Courier New" panose="02070309020205020404" pitchFamily="49" charset="0"/>
+                <a:cs typeface="Courier New" panose="02070309020205020404" pitchFamily="49" charset="0"/>
+              </a:rPr>
               <a:t>|       rvc_asap_pkg.sv</a:t>
             </a:r>
+          </a:p>
+          <a:p>
+            <a:r>
+              <a:rPr lang="en-US" sz="1400" dirty="0">
+                <a:solidFill>
+                  <a:schemeClr val="accent2">
+                    <a:lumMod val="20000"/>
+                    <a:lumOff val="80000"/>
+                  </a:schemeClr>
+                </a:solidFill>
+                <a:latin typeface="Courier New" panose="02070309020205020404" pitchFamily="49" charset="0"/>
+                <a:cs typeface="Courier New" panose="02070309020205020404" pitchFamily="49" charset="0"/>
+              </a:rPr>
+              <a:t>|       rvc_mem_wrap.sv</a:t>
+            </a:r>
+          </a:p>
+          <a:p>
+            <a:r>
+              <a:rPr lang="en-US" sz="1400" dirty="0">
+                <a:solidFill>
+                  <a:schemeClr val="accent2">
+                    <a:lumMod val="20000"/>
+                    <a:lumOff val="80000"/>
+                  </a:schemeClr>
+                </a:solidFill>
+                <a:latin typeface="Courier New" panose="02070309020205020404" pitchFamily="49" charset="0"/>
+                <a:cs typeface="Courier New" panose="02070309020205020404" pitchFamily="49" charset="0"/>
+              </a:rPr>
+              <a:t>|       rvc_top.sv</a:t>
+            </a:r>
+          </a:p>
+          <a:p>
+            <a:r>
+              <a:rPr lang="en-US" sz="1600" b="1" dirty="0">
+                <a:solidFill>
+                  <a:schemeClr val="accent2">
+                    <a:lumMod val="20000"/>
+                    <a:lumOff val="80000"/>
+                  </a:schemeClr>
+                </a:solidFill>
+                <a:latin typeface="Courier New" panose="02070309020205020404" pitchFamily="49" charset="0"/>
+                <a:cs typeface="Courier New" panose="02070309020205020404" pitchFamily="49" charset="0"/>
+              </a:rPr>
+              <a:t>+---</a:t>
+            </a:r>
+            <a:r>
+              <a:rPr lang="en-US" sz="1600" b="1" i="1" u="sng" dirty="0">
+                <a:solidFill>
+                  <a:schemeClr val="accent2">
+                    <a:lumMod val="20000"/>
+                    <a:lumOff val="80000"/>
+                  </a:schemeClr>
+                </a:solidFill>
+                <a:latin typeface="Courier New" panose="02070309020205020404" pitchFamily="49" charset="0"/>
+                <a:cs typeface="Courier New" panose="02070309020205020404" pitchFamily="49" charset="0"/>
+              </a:rPr>
+              <a:t>target</a:t>
+            </a:r>
+          </a:p>
+          <a:p>
+            <a:r>
+              <a:rPr lang="en-US" sz="1400" dirty="0">
+                <a:solidFill>
+                  <a:schemeClr val="accent2">
+                    <a:lumMod val="20000"/>
+                    <a:lumOff val="80000"/>
+                  </a:schemeClr>
+                </a:solidFill>
+                <a:latin typeface="Courier New" panose="02070309020205020404" pitchFamily="49" charset="0"/>
+                <a:cs typeface="Courier New" panose="02070309020205020404" pitchFamily="49" charset="0"/>
+              </a:rPr>
+              <a:t>|       +---addition</a:t>
+            </a:r>
+          </a:p>
+          <a:p>
+            <a:r>
+              <a:rPr lang="en-US" sz="1400" dirty="0">
+                <a:solidFill>
+                  <a:schemeClr val="accent2">
+                    <a:lumMod val="20000"/>
+                    <a:lumOff val="80000"/>
+                  </a:schemeClr>
+                </a:solidFill>
+                <a:latin typeface="Courier New" panose="02070309020205020404" pitchFamily="49" charset="0"/>
+                <a:cs typeface="Courier New" panose="02070309020205020404" pitchFamily="49" charset="0"/>
+              </a:rPr>
+              <a:t>|       +---additionrv32i</a:t>
+            </a:r>
+          </a:p>
+          <a:p>
+            <a:r>
+              <a:rPr lang="en-US" sz="1400" dirty="0">
+                <a:solidFill>
+                  <a:schemeClr val="accent2">
+                    <a:lumMod val="20000"/>
+                    <a:lumOff val="80000"/>
+                  </a:schemeClr>
+                </a:solidFill>
+                <a:latin typeface="Courier New" panose="02070309020205020404" pitchFamily="49" charset="0"/>
+                <a:cs typeface="Courier New" panose="02070309020205020404" pitchFamily="49" charset="0"/>
+              </a:rPr>
+              <a:t>|       +---basic_commands1</a:t>
+            </a:r>
+          </a:p>
+          <a:p>
+            <a:r>
+              <a:rPr lang="en-US" sz="1400" dirty="0">
+                <a:solidFill>
+                  <a:schemeClr val="accent2">
+                    <a:lumMod val="20000"/>
+                    <a:lumOff val="80000"/>
+                  </a:schemeClr>
+                </a:solidFill>
+                <a:latin typeface="Courier New" panose="02070309020205020404" pitchFamily="49" charset="0"/>
+                <a:cs typeface="Courier New" panose="02070309020205020404" pitchFamily="49" charset="0"/>
+              </a:rPr>
+              <a:t>|       +---basic_commands2</a:t>
+            </a:r>
+          </a:p>
+          <a:p>
+            <a:r>
+              <a:rPr lang="en-US" sz="1400" dirty="0">
+                <a:solidFill>
+                  <a:schemeClr val="accent2">
+                    <a:lumMod val="20000"/>
+                    <a:lumOff val="80000"/>
+                  </a:schemeClr>
+                </a:solidFill>
+                <a:latin typeface="Courier New" panose="02070309020205020404" pitchFamily="49" charset="0"/>
+                <a:cs typeface="Courier New" panose="02070309020205020404" pitchFamily="49" charset="0"/>
+              </a:rPr>
+              <a:t>|       +---</a:t>
+            </a:r>
+            <a:r>
+              <a:rPr lang="en-US" sz="1400" dirty="0" err="1">
+                <a:solidFill>
+                  <a:schemeClr val="accent2">
+                    <a:lumMod val="20000"/>
+                    <a:lumOff val="80000"/>
+                  </a:schemeClr>
+                </a:solidFill>
+                <a:latin typeface="Courier New" panose="02070309020205020404" pitchFamily="49" charset="0"/>
+                <a:cs typeface="Courier New" panose="02070309020205020404" pitchFamily="49" charset="0"/>
+              </a:rPr>
+              <a:t>jump_commands</a:t>
+            </a:r>
+            <a:endParaRPr lang="en-US" sz="1400" dirty="0">
+              <a:solidFill>
+                <a:schemeClr val="accent2">
+                  <a:lumMod val="20000"/>
+                  <a:lumOff val="80000"/>
+                </a:schemeClr>
+              </a:solidFill>
+              <a:latin typeface="Courier New" panose="02070309020205020404" pitchFamily="49" charset="0"/>
+              <a:cs typeface="Courier New" panose="02070309020205020404" pitchFamily="49" charset="0"/>
+            </a:endParaRPr>
+          </a:p>
+          <a:p>
+            <a:r>
+              <a:rPr lang="en-US" sz="1400" dirty="0">
+                <a:solidFill>
+                  <a:schemeClr val="accent2">
+                    <a:lumMod val="20000"/>
+                    <a:lumOff val="80000"/>
+                  </a:schemeClr>
+                </a:solidFill>
+                <a:latin typeface="Courier New" panose="02070309020205020404" pitchFamily="49" charset="0"/>
+                <a:cs typeface="Courier New" panose="02070309020205020404" pitchFamily="49" charset="0"/>
+              </a:rPr>
+              <a:t>|       +---</a:t>
+            </a:r>
+            <a:r>
+              <a:rPr lang="en-US" sz="1400" dirty="0" err="1">
+                <a:solidFill>
+                  <a:schemeClr val="accent2">
+                    <a:lumMod val="20000"/>
+                    <a:lumOff val="80000"/>
+                  </a:schemeClr>
+                </a:solidFill>
+                <a:latin typeface="Courier New" panose="02070309020205020404" pitchFamily="49" charset="0"/>
+                <a:cs typeface="Courier New" panose="02070309020205020404" pitchFamily="49" charset="0"/>
+              </a:rPr>
+              <a:t>simple_add_test</a:t>
+            </a:r>
+            <a:endParaRPr lang="en-US" sz="1400" dirty="0">
+              <a:solidFill>
+                <a:schemeClr val="accent2">
+                  <a:lumMod val="20000"/>
+                  <a:lumOff val="80000"/>
+                </a:schemeClr>
+              </a:solidFill>
+              <a:latin typeface="Courier New" panose="02070309020205020404" pitchFamily="49" charset="0"/>
+              <a:cs typeface="Courier New" panose="02070309020205020404" pitchFamily="49" charset="0"/>
+            </a:endParaRPr>
+          </a:p>
+          <a:p>
+            <a:r>
+              <a:rPr lang="en-US" sz="1400" dirty="0">
+                <a:solidFill>
+                  <a:schemeClr val="accent2">
+                    <a:lumMod val="20000"/>
+                    <a:lumOff val="80000"/>
+                  </a:schemeClr>
+                </a:solidFill>
+                <a:latin typeface="Courier New" panose="02070309020205020404" pitchFamily="49" charset="0"/>
+                <a:cs typeface="Courier New" panose="02070309020205020404" pitchFamily="49" charset="0"/>
+              </a:rPr>
+              <a:t>|       +---</a:t>
+            </a:r>
+            <a:r>
+              <a:rPr lang="en-US" sz="1400" dirty="0" err="1">
+                <a:solidFill>
+                  <a:schemeClr val="accent2">
+                    <a:lumMod val="20000"/>
+                    <a:lumOff val="80000"/>
+                  </a:schemeClr>
+                </a:solidFill>
+                <a:latin typeface="Courier New" panose="02070309020205020404" pitchFamily="49" charset="0"/>
+                <a:cs typeface="Courier New" panose="02070309020205020404" pitchFamily="49" charset="0"/>
+              </a:rPr>
+              <a:t>test_asap</a:t>
+            </a:r>
+            <a:endParaRPr lang="en-US" sz="1400" dirty="0">
+              <a:solidFill>
+                <a:schemeClr val="accent2">
+                  <a:lumMod val="20000"/>
+                  <a:lumOff val="80000"/>
+                </a:schemeClr>
+              </a:solidFill>
+              <a:latin typeface="Courier New" panose="02070309020205020404" pitchFamily="49" charset="0"/>
+              <a:cs typeface="Courier New" panose="02070309020205020404" pitchFamily="49" charset="0"/>
+            </a:endParaRPr>
           </a:p>
           <a:p>
             <a:r>
@@ -22569,7 +23527,35 @@
               </a:rPr>
               <a:t>|       rvc_asap_tb.sv</a:t>
             </a:r>
-            <a:endParaRPr lang="pt-BR" sz="1400" dirty="0">
+          </a:p>
+          <a:p>
+            <a:r>
+              <a:rPr lang="en-US" sz="1400" dirty="0">
+                <a:solidFill>
+                  <a:schemeClr val="accent2">
+                    <a:lumMod val="20000"/>
+                    <a:lumOff val="80000"/>
+                  </a:schemeClr>
+                </a:solidFill>
+                <a:latin typeface="Courier New" panose="02070309020205020404" pitchFamily="49" charset="0"/>
+                <a:cs typeface="Courier New" panose="02070309020205020404" pitchFamily="49" charset="0"/>
+              </a:rPr>
+              <a:t>|       +---</a:t>
+            </a:r>
+            <a:r>
+              <a:rPr lang="en-US" sz="1400" dirty="0" err="1">
+                <a:solidFill>
+                  <a:schemeClr val="accent2">
+                    <a:lumMod val="20000"/>
+                    <a:lumOff val="80000"/>
+                  </a:schemeClr>
+                </a:solidFill>
+                <a:latin typeface="Courier New" panose="02070309020205020404" pitchFamily="49" charset="0"/>
+                <a:cs typeface="Courier New" panose="02070309020205020404" pitchFamily="49" charset="0"/>
+              </a:rPr>
+              <a:t>golden_image</a:t>
+            </a:r>
+            <a:endParaRPr lang="en-US" sz="1400" dirty="0">
               <a:solidFill>
                 <a:schemeClr val="accent2">
                   <a:lumMod val="20000"/>
@@ -22596,6 +23582,100 @@
 </file>
 
 <file path=ppt/slides/slide33.xml><?xml version="1.0" encoding="utf-8"?>
+<p:sld xmlns:a="http://schemas.openxmlformats.org/drawingml/2006/main" xmlns:r="http://schemas.openxmlformats.org/officeDocument/2006/relationships" xmlns:p="http://schemas.openxmlformats.org/presentationml/2006/main">
+  <p:cSld>
+    <p:spTree>
+      <p:nvGrpSpPr>
+        <p:cNvPr id="1" name=""/>
+        <p:cNvGrpSpPr/>
+        <p:nvPr/>
+      </p:nvGrpSpPr>
+      <p:grpSpPr>
+        <a:xfrm>
+          <a:off x="0" y="0"/>
+          <a:ext cx="0" cy="0"/>
+          <a:chOff x="0" y="0"/>
+          <a:chExt cx="0" cy="0"/>
+        </a:xfrm>
+      </p:grpSpPr>
+      <p:sp>
+        <p:nvSpPr>
+          <p:cNvPr id="2" name="כותרת 1">
+            <a:extLst>
+              <a:ext uri="{FF2B5EF4-FFF2-40B4-BE49-F238E27FC236}">
+                <a16:creationId xmlns:a16="http://schemas.microsoft.com/office/drawing/2014/main" id="{9B33EB35-0B81-4053-BD8F-A0DAD844C895}"/>
+              </a:ext>
+            </a:extLst>
+          </p:cNvPr>
+          <p:cNvSpPr>
+            <a:spLocks noGrp="1"/>
+          </p:cNvSpPr>
+          <p:nvPr>
+            <p:ph type="title"/>
+          </p:nvPr>
+        </p:nvSpPr>
+        <p:spPr/>
+        <p:txBody>
+          <a:bodyPr/>
+          <a:lstStyle/>
+          <a:p>
+            <a:r>
+              <a:rPr lang="en-US" dirty="0"/>
+              <a:t>What’s next?</a:t>
+            </a:r>
+            <a:endParaRPr lang="he-IL" dirty="0"/>
+          </a:p>
+        </p:txBody>
+      </p:sp>
+      <p:sp>
+        <p:nvSpPr>
+          <p:cNvPr id="3" name="מציין מיקום תוכן 2">
+            <a:extLst>
+              <a:ext uri="{FF2B5EF4-FFF2-40B4-BE49-F238E27FC236}">
+                <a16:creationId xmlns:a16="http://schemas.microsoft.com/office/drawing/2014/main" id="{B29F8DA3-8AE8-48DC-B03F-C5E6B6CF4041}"/>
+              </a:ext>
+            </a:extLst>
+          </p:cNvPr>
+          <p:cNvSpPr>
+            <a:spLocks noGrp="1"/>
+          </p:cNvSpPr>
+          <p:nvPr>
+            <p:ph idx="1"/>
+          </p:nvPr>
+        </p:nvSpPr>
+        <p:spPr/>
+        <p:txBody>
+          <a:bodyPr/>
+          <a:lstStyle/>
+          <a:p>
+            <a:r>
+              <a:rPr lang="en-US" dirty="0"/>
+              <a:t>Add to architecture pipeline staging</a:t>
+            </a:r>
+          </a:p>
+          <a:p>
+            <a:r>
+              <a:rPr lang="en-US" dirty="0"/>
+              <a:t>Add VGA control for running applications with visual interface on FPGA</a:t>
+            </a:r>
+            <a:endParaRPr lang="he-IL" dirty="0"/>
+          </a:p>
+        </p:txBody>
+      </p:sp>
+    </p:spTree>
+    <p:extLst>
+      <p:ext uri="{BB962C8B-B14F-4D97-AF65-F5344CB8AC3E}">
+        <p14:creationId xmlns:p14="http://schemas.microsoft.com/office/powerpoint/2010/main" val="3740678725"/>
+      </p:ext>
+    </p:extLst>
+  </p:cSld>
+  <p:clrMapOvr>
+    <a:masterClrMapping/>
+  </p:clrMapOvr>
+</p:sld>
+</file>
+
+<file path=ppt/slides/slide34.xml><?xml version="1.0" encoding="utf-8"?>
 <p:sld xmlns:a="http://schemas.openxmlformats.org/drawingml/2006/main" xmlns:r="http://schemas.openxmlformats.org/officeDocument/2006/relationships" xmlns:p="http://schemas.openxmlformats.org/presentationml/2006/main">
   <p:cSld>
     <p:spTree>
@@ -22699,345 +23779,6 @@
 </p:sld>
 </file>
 
-<file path=ppt/slides/slide34.xml><?xml version="1.0" encoding="utf-8"?>
-<p:sld xmlns:a="http://schemas.openxmlformats.org/drawingml/2006/main" xmlns:r="http://schemas.openxmlformats.org/officeDocument/2006/relationships" xmlns:p="http://schemas.openxmlformats.org/presentationml/2006/main">
-  <p:cSld>
-    <p:spTree>
-      <p:nvGrpSpPr>
-        <p:cNvPr id="1" name=""/>
-        <p:cNvGrpSpPr/>
-        <p:nvPr/>
-      </p:nvGrpSpPr>
-      <p:grpSpPr>
-        <a:xfrm>
-          <a:off x="0" y="0"/>
-          <a:ext cx="0" cy="0"/>
-          <a:chOff x="0" y="0"/>
-          <a:chExt cx="0" cy="0"/>
-        </a:xfrm>
-      </p:grpSpPr>
-      <p:sp>
-        <p:nvSpPr>
-          <p:cNvPr id="2" name="Title 1">
-            <a:extLst>
-              <a:ext uri="{FF2B5EF4-FFF2-40B4-BE49-F238E27FC236}">
-                <a16:creationId xmlns:a16="http://schemas.microsoft.com/office/drawing/2014/main" id="{43953E14-D2C8-4372-9D39-C41D5B2F918F}"/>
-              </a:ext>
-            </a:extLst>
-          </p:cNvPr>
-          <p:cNvSpPr>
-            <a:spLocks noGrp="1"/>
-          </p:cNvSpPr>
-          <p:nvPr>
-            <p:ph type="title"/>
-          </p:nvPr>
-        </p:nvSpPr>
-        <p:spPr/>
-        <p:txBody>
-          <a:bodyPr/>
-          <a:lstStyle/>
-          <a:p>
-            <a:r>
-              <a:rPr lang="en-US" dirty="0"/>
-              <a:t>Backup</a:t>
-            </a:r>
-            <a:endParaRPr lang="en-IL" dirty="0"/>
-          </a:p>
-        </p:txBody>
-      </p:sp>
-      <p:sp>
-        <p:nvSpPr>
-          <p:cNvPr id="4" name="Rectangle 3">
-            <a:extLst>
-              <a:ext uri="{FF2B5EF4-FFF2-40B4-BE49-F238E27FC236}">
-                <a16:creationId xmlns:a16="http://schemas.microsoft.com/office/drawing/2014/main" id="{C1918B80-5E3D-46EC-823E-70F8ABD94350}"/>
-              </a:ext>
-            </a:extLst>
-          </p:cNvPr>
-          <p:cNvSpPr/>
-          <p:nvPr/>
-        </p:nvSpPr>
-        <p:spPr>
-          <a:xfrm>
-            <a:off x="93045" y="3468336"/>
-            <a:ext cx="7156518" cy="2308324"/>
-          </a:xfrm>
-          <a:prstGeom prst="rect">
-            <a:avLst/>
-          </a:prstGeom>
-          <a:solidFill>
-            <a:schemeClr val="bg1">
-              <a:lumMod val="85000"/>
-              <a:lumOff val="15000"/>
-            </a:schemeClr>
-          </a:solidFill>
-          <a:ln>
-            <a:solidFill>
-              <a:schemeClr val="tx1">
-                <a:lumMod val="65000"/>
-              </a:schemeClr>
-            </a:solidFill>
-          </a:ln>
-        </p:spPr>
-        <p:txBody>
-          <a:bodyPr wrap="square">
-            <a:spAutoFit/>
-          </a:bodyPr>
-          <a:lstStyle/>
-          <a:p>
-            <a:r>
-              <a:rPr lang="en-US" sz="1200" dirty="0" err="1">
-                <a:latin typeface="Courier New" panose="02070309020205020404" pitchFamily="49" charset="0"/>
-                <a:cs typeface="Courier New" panose="02070309020205020404" pitchFamily="49" charset="0"/>
-              </a:rPr>
-              <a:t>always_comb</a:t>
-            </a:r>
-            <a:r>
-              <a:rPr lang="en-US" sz="1200" dirty="0">
-                <a:latin typeface="Courier New" panose="02070309020205020404" pitchFamily="49" charset="0"/>
-                <a:cs typeface="Courier New" panose="02070309020205020404" pitchFamily="49" charset="0"/>
-              </a:rPr>
-              <a:t> begin : </a:t>
-            </a:r>
-            <a:r>
-              <a:rPr lang="en-US" sz="1200" dirty="0" err="1">
-                <a:latin typeface="Courier New" panose="02070309020205020404" pitchFamily="49" charset="0"/>
-                <a:cs typeface="Courier New" panose="02070309020205020404" pitchFamily="49" charset="0"/>
-              </a:rPr>
-              <a:t>branch_comp</a:t>
-            </a:r>
-            <a:endParaRPr lang="en-US" sz="1200" dirty="0">
-              <a:latin typeface="Courier New" panose="02070309020205020404" pitchFamily="49" charset="0"/>
-              <a:cs typeface="Courier New" panose="02070309020205020404" pitchFamily="49" charset="0"/>
-            </a:endParaRPr>
-          </a:p>
-          <a:p>
-            <a:r>
-              <a:rPr lang="en-US" sz="1200" dirty="0">
-                <a:latin typeface="Courier New" panose="02070309020205020404" pitchFamily="49" charset="0"/>
-                <a:cs typeface="Courier New" panose="02070309020205020404" pitchFamily="49" charset="0"/>
-              </a:rPr>
-              <a:t>  //for branch condition.</a:t>
-            </a:r>
-          </a:p>
-          <a:p>
-            <a:r>
-              <a:rPr lang="en-US" sz="1200" dirty="0">
-                <a:latin typeface="Courier New" panose="02070309020205020404" pitchFamily="49" charset="0"/>
-                <a:cs typeface="Courier New" panose="02070309020205020404" pitchFamily="49" charset="0"/>
-              </a:rPr>
-              <a:t>  unique casez ({CtrlBranchOp})</a:t>
-            </a:r>
-          </a:p>
-          <a:p>
-            <a:r>
-              <a:rPr lang="en-US" sz="1200" dirty="0">
-                <a:latin typeface="Courier New" panose="02070309020205020404" pitchFamily="49" charset="0"/>
-                <a:cs typeface="Courier New" panose="02070309020205020404" pitchFamily="49" charset="0"/>
-              </a:rPr>
-              <a:t>    BEQ     : BranchCondMet =  (AluIn1==AluIn2)                   ;// BEQ</a:t>
-            </a:r>
-          </a:p>
-          <a:p>
-            <a:r>
-              <a:rPr lang="en-US" sz="1200" dirty="0">
-                <a:latin typeface="Courier New" panose="02070309020205020404" pitchFamily="49" charset="0"/>
-                <a:cs typeface="Courier New" panose="02070309020205020404" pitchFamily="49" charset="0"/>
-              </a:rPr>
-              <a:t>    BNE     : BranchCondMet = ~(AluIn1==AluIn2)                   ;// BNE</a:t>
-            </a:r>
-          </a:p>
-          <a:p>
-            <a:r>
-              <a:rPr lang="en-US" sz="1200" dirty="0">
-                <a:latin typeface="Courier New" panose="02070309020205020404" pitchFamily="49" charset="0"/>
-                <a:cs typeface="Courier New" panose="02070309020205020404" pitchFamily="49" charset="0"/>
-              </a:rPr>
-              <a:t>    BLT     : BranchCondMet =  ($signed(AluIn1)&lt;$signed(AluIn2))  ;// BLT</a:t>
-            </a:r>
-          </a:p>
-          <a:p>
-            <a:r>
-              <a:rPr lang="en-US" sz="1200" dirty="0">
-                <a:latin typeface="Courier New" panose="02070309020205020404" pitchFamily="49" charset="0"/>
-                <a:cs typeface="Courier New" panose="02070309020205020404" pitchFamily="49" charset="0"/>
-              </a:rPr>
-              <a:t>    BGE     : BranchCondMet = ~($signed(AluIn1)&lt;$signed(AluIn2))  ;// BGE</a:t>
-            </a:r>
-          </a:p>
-          <a:p>
-            <a:r>
-              <a:rPr lang="en-US" sz="1200" dirty="0">
-                <a:latin typeface="Courier New" panose="02070309020205020404" pitchFamily="49" charset="0"/>
-                <a:cs typeface="Courier New" panose="02070309020205020404" pitchFamily="49" charset="0"/>
-              </a:rPr>
-              <a:t>    BLTU    : BranchCondMet =  (AluIn1&lt;AluIn2)                    ;// BLTU</a:t>
-            </a:r>
-          </a:p>
-          <a:p>
-            <a:r>
-              <a:rPr lang="en-US" sz="1200" dirty="0">
-                <a:latin typeface="Courier New" panose="02070309020205020404" pitchFamily="49" charset="0"/>
-                <a:cs typeface="Courier New" panose="02070309020205020404" pitchFamily="49" charset="0"/>
-              </a:rPr>
-              <a:t>    BGEU    : BranchCondMet = ~(AluIn1&lt;AluIn2)                    ;// BGEU</a:t>
-            </a:r>
-          </a:p>
-          <a:p>
-            <a:r>
-              <a:rPr lang="en-US" sz="1200" dirty="0">
-                <a:latin typeface="Courier New" panose="02070309020205020404" pitchFamily="49" charset="0"/>
-                <a:cs typeface="Courier New" panose="02070309020205020404" pitchFamily="49" charset="0"/>
-              </a:rPr>
-              <a:t>    default : BranchCondMet = 1'b0                                ;</a:t>
-            </a:r>
-          </a:p>
-          <a:p>
-            <a:r>
-              <a:rPr lang="en-US" sz="1200" dirty="0">
-                <a:latin typeface="Courier New" panose="02070309020205020404" pitchFamily="49" charset="0"/>
-                <a:cs typeface="Courier New" panose="02070309020205020404" pitchFamily="49" charset="0"/>
-              </a:rPr>
-              <a:t>  endcase</a:t>
-            </a:r>
-          </a:p>
-          <a:p>
-            <a:r>
-              <a:rPr lang="en-US" sz="1200" dirty="0">
-                <a:latin typeface="Courier New" panose="02070309020205020404" pitchFamily="49" charset="0"/>
-                <a:cs typeface="Courier New" panose="02070309020205020404" pitchFamily="49" charset="0"/>
-              </a:rPr>
-              <a:t>end</a:t>
-            </a:r>
-          </a:p>
-        </p:txBody>
-      </p:sp>
-      <p:sp>
-        <p:nvSpPr>
-          <p:cNvPr id="5" name="Rectangle 4">
-            <a:extLst>
-              <a:ext uri="{FF2B5EF4-FFF2-40B4-BE49-F238E27FC236}">
-                <a16:creationId xmlns:a16="http://schemas.microsoft.com/office/drawing/2014/main" id="{F08AAD3B-7801-4FA7-8EAA-641772676A3B}"/>
-              </a:ext>
-            </a:extLst>
-          </p:cNvPr>
-          <p:cNvSpPr/>
-          <p:nvPr/>
-        </p:nvSpPr>
-        <p:spPr>
-          <a:xfrm>
-            <a:off x="93045" y="1762862"/>
-            <a:ext cx="7156518" cy="1569660"/>
-          </a:xfrm>
-          <a:prstGeom prst="rect">
-            <a:avLst/>
-          </a:prstGeom>
-          <a:solidFill>
-            <a:schemeClr val="bg1">
-              <a:lumMod val="85000"/>
-              <a:lumOff val="15000"/>
-            </a:schemeClr>
-          </a:solidFill>
-          <a:ln>
-            <a:solidFill>
-              <a:schemeClr val="tx1">
-                <a:lumMod val="65000"/>
-              </a:schemeClr>
-            </a:solidFill>
-          </a:ln>
-        </p:spPr>
-        <p:txBody>
-          <a:bodyPr wrap="square">
-            <a:spAutoFit/>
-          </a:bodyPr>
-          <a:lstStyle/>
-          <a:p>
-            <a:r>
-              <a:rPr lang="en-US" sz="1200" dirty="0">
-                <a:latin typeface="Courier New" panose="02070309020205020404" pitchFamily="49" charset="0"/>
-                <a:cs typeface="Courier New" panose="02070309020205020404" pitchFamily="49" charset="0"/>
-              </a:rPr>
-              <a:t> unique casez (Opcode)    //mux</a:t>
-            </a:r>
-          </a:p>
-          <a:p>
-            <a:r>
-              <a:rPr lang="en-US" sz="1200" dirty="0">
-                <a:latin typeface="Courier New" panose="02070309020205020404" pitchFamily="49" charset="0"/>
-                <a:cs typeface="Courier New" panose="02070309020205020404" pitchFamily="49" charset="0"/>
-              </a:rPr>
-              <a:t>    JALR, I_OP, LOAD : SelImmType = I_TYPE;</a:t>
-            </a:r>
-          </a:p>
-          <a:p>
-            <a:r>
-              <a:rPr lang="en-US" sz="1200" dirty="0">
-                <a:latin typeface="Courier New" panose="02070309020205020404" pitchFamily="49" charset="0"/>
-                <a:cs typeface="Courier New" panose="02070309020205020404" pitchFamily="49" charset="0"/>
-              </a:rPr>
-              <a:t>    LUI, AUIPC       : SelImmType = U_TYPE;</a:t>
-            </a:r>
-          </a:p>
-          <a:p>
-            <a:r>
-              <a:rPr lang="en-US" sz="1200" dirty="0">
-                <a:latin typeface="Courier New" panose="02070309020205020404" pitchFamily="49" charset="0"/>
-                <a:cs typeface="Courier New" panose="02070309020205020404" pitchFamily="49" charset="0"/>
-              </a:rPr>
-              <a:t>    JAL              : SelImmType = J_TYPE;</a:t>
-            </a:r>
-          </a:p>
-          <a:p>
-            <a:r>
-              <a:rPr lang="en-US" sz="1200" dirty="0">
-                <a:latin typeface="Courier New" panose="02070309020205020404" pitchFamily="49" charset="0"/>
-                <a:cs typeface="Courier New" panose="02070309020205020404" pitchFamily="49" charset="0"/>
-              </a:rPr>
-              <a:t>    BRANCH           : SelImmType = B_TYPE;</a:t>
-            </a:r>
-          </a:p>
-          <a:p>
-            <a:r>
-              <a:rPr lang="en-US" sz="1200" dirty="0">
-                <a:latin typeface="Courier New" panose="02070309020205020404" pitchFamily="49" charset="0"/>
-                <a:cs typeface="Courier New" panose="02070309020205020404" pitchFamily="49" charset="0"/>
-              </a:rPr>
-              <a:t>    STORE            : SelImmType = S_TYPE;</a:t>
-            </a:r>
-          </a:p>
-          <a:p>
-            <a:r>
-              <a:rPr lang="en-US" sz="1200" dirty="0">
-                <a:latin typeface="Courier New" panose="02070309020205020404" pitchFamily="49" charset="0"/>
-                <a:cs typeface="Courier New" panose="02070309020205020404" pitchFamily="49" charset="0"/>
-              </a:rPr>
-              <a:t>    default          : SelImmType = I_TYPE;</a:t>
-            </a:r>
-          </a:p>
-          <a:p>
-            <a:r>
-              <a:rPr lang="en-US" sz="1200" dirty="0">
-                <a:latin typeface="Courier New" panose="02070309020205020404" pitchFamily="49" charset="0"/>
-                <a:cs typeface="Courier New" panose="02070309020205020404" pitchFamily="49" charset="0"/>
-              </a:rPr>
-              <a:t>  endcase</a:t>
-            </a:r>
-          </a:p>
-        </p:txBody>
-      </p:sp>
-    </p:spTree>
-    <p:extLst>
-      <p:ext uri="{BB962C8B-B14F-4D97-AF65-F5344CB8AC3E}">
-        <p14:creationId xmlns:p14="http://schemas.microsoft.com/office/powerpoint/2010/main" val="3383740315"/>
-      </p:ext>
-    </p:extLst>
-  </p:cSld>
-  <p:clrMapOvr>
-    <a:masterClrMapping/>
-  </p:clrMapOvr>
-</p:sld>
-</file>
-
 <file path=ppt/slides/slide35.xml><?xml version="1.0" encoding="utf-8"?>
 <p:sld xmlns:a="http://schemas.openxmlformats.org/drawingml/2006/main" xmlns:r="http://schemas.openxmlformats.org/officeDocument/2006/relationships" xmlns:p="http://schemas.openxmlformats.org/presentationml/2006/main">
   <p:cSld>
@@ -23086,10 +23827,10 @@
       </p:sp>
       <p:sp>
         <p:nvSpPr>
-          <p:cNvPr id="7" name="Rectangle 6">
+          <p:cNvPr id="4" name="Rectangle 3">
             <a:extLst>
               <a:ext uri="{FF2B5EF4-FFF2-40B4-BE49-F238E27FC236}">
-                <a16:creationId xmlns:a16="http://schemas.microsoft.com/office/drawing/2014/main" id="{7C2EE6B6-A272-4FC9-896D-147A2E5F165C}"/>
+                <a16:creationId xmlns:a16="http://schemas.microsoft.com/office/drawing/2014/main" id="{C1918B80-5E3D-46EC-823E-70F8ABD94350}"/>
               </a:ext>
             </a:extLst>
           </p:cNvPr>
@@ -23098,8 +23839,8 @@
         </p:nvSpPr>
         <p:spPr>
           <a:xfrm>
-            <a:off x="262954" y="1375207"/>
-            <a:ext cx="6291849" cy="5262979"/>
+            <a:off x="93045" y="3468336"/>
+            <a:ext cx="7959822" cy="2308324"/>
           </a:xfrm>
           <a:prstGeom prst="rect">
             <a:avLst/>
@@ -23136,8 +23877,19 @@
                 <a:latin typeface="Courier New" panose="02070309020205020404" pitchFamily="49" charset="0"/>
                 <a:cs typeface="Courier New" panose="02070309020205020404" pitchFamily="49" charset="0"/>
               </a:rPr>
-              <a:t> begin</a:t>
-            </a:r>
+              <a:t> begin : </a:t>
+            </a:r>
+            <a:r>
+              <a:rPr lang="en-US" sz="1200" dirty="0" err="1">
+                <a:latin typeface="Courier New" panose="02070309020205020404" pitchFamily="49" charset="0"/>
+                <a:cs typeface="Courier New" panose="02070309020205020404" pitchFamily="49" charset="0"/>
+              </a:rPr>
+              <a:t>branch_comp</a:t>
+            </a:r>
+            <a:endParaRPr lang="en-US" sz="1200" dirty="0">
+              <a:latin typeface="Courier New" panose="02070309020205020404" pitchFamily="49" charset="0"/>
+              <a:cs typeface="Courier New" panose="02070309020205020404" pitchFamily="49" charset="0"/>
+            </a:endParaRPr>
           </a:p>
           <a:p>
             <a:r>
@@ -23145,7 +23897,7 @@
                 <a:latin typeface="Courier New" panose="02070309020205020404" pitchFamily="49" charset="0"/>
                 <a:cs typeface="Courier New" panose="02070309020205020404" pitchFamily="49" charset="0"/>
               </a:rPr>
-              <a:t>    unique casez ({Funct3, Funct7, Opcode})</a:t>
+              <a:t>  //for branch condition.</a:t>
             </a:r>
           </a:p>
           <a:p>
@@ -23154,7 +23906,7 @@
                 <a:latin typeface="Courier New" panose="02070309020205020404" pitchFamily="49" charset="0"/>
                 <a:cs typeface="Courier New" panose="02070309020205020404" pitchFamily="49" charset="0"/>
               </a:rPr>
-              <a:t>    //-----R type-------</a:t>
+              <a:t>  unique casez ({CtrlBranchOp})</a:t>
             </a:r>
           </a:p>
           <a:p>
@@ -23163,7 +23915,7 @@
                 <a:latin typeface="Courier New" panose="02070309020205020404" pitchFamily="49" charset="0"/>
                 <a:cs typeface="Courier New" panose="02070309020205020404" pitchFamily="49" charset="0"/>
               </a:rPr>
-              <a:t>    {3'b000, 7'b0000000, R_OP} : CtrlAluOp = ADD; //ADD</a:t>
+              <a:t>    BEQ     : BranchCondMet =  (RegRdData1==RegRdData2)                   ;// BEQ</a:t>
             </a:r>
           </a:p>
           <a:p>
@@ -23172,7 +23924,7 @@
                 <a:latin typeface="Courier New" panose="02070309020205020404" pitchFamily="49" charset="0"/>
                 <a:cs typeface="Courier New" panose="02070309020205020404" pitchFamily="49" charset="0"/>
               </a:rPr>
-              <a:t>    {3'b000, 7'b0100000, R_OP} : CtrlAluOp = SUB; //SUB</a:t>
+              <a:t>    BNE     : BranchCondMet = ~(RegRdData1==RegRdData2)                   ;// BNE</a:t>
             </a:r>
           </a:p>
           <a:p>
@@ -23181,7 +23933,7 @@
                 <a:latin typeface="Courier New" panose="02070309020205020404" pitchFamily="49" charset="0"/>
                 <a:cs typeface="Courier New" panose="02070309020205020404" pitchFamily="49" charset="0"/>
               </a:rPr>
-              <a:t>    {3'b001, 7'b0000000, R_OP} : CtrlAluOp = SLL; //SLL</a:t>
+              <a:t>    BLT     : BranchCondMet =  ($signed(RegRdData1)&lt;$signed(RegRdData2))  ;// BLT</a:t>
             </a:r>
           </a:p>
           <a:p>
@@ -23190,7 +23942,7 @@
                 <a:latin typeface="Courier New" panose="02070309020205020404" pitchFamily="49" charset="0"/>
                 <a:cs typeface="Courier New" panose="02070309020205020404" pitchFamily="49" charset="0"/>
               </a:rPr>
-              <a:t>    {3'b010, 7'b0000000, R_OP} : CtrlAluOp = SLT; //SLT</a:t>
+              <a:t>    BGE     : BranchCondMet = ~($signed(RegRdData1)&lt;$signed(RegRdData2))  ;// BGE</a:t>
             </a:r>
           </a:p>
           <a:p>
@@ -23199,7 +23951,7 @@
                 <a:latin typeface="Courier New" panose="02070309020205020404" pitchFamily="49" charset="0"/>
                 <a:cs typeface="Courier New" panose="02070309020205020404" pitchFamily="49" charset="0"/>
               </a:rPr>
-              <a:t>    {3'b011, 7'b0000000, R_OP} : CtrlAluOp = SLTU;//SLTU</a:t>
+              <a:t>    BLTU    : BranchCondMet =  (RegRdData1&lt;RegRdData2)                    ;// BLTU</a:t>
             </a:r>
           </a:p>
           <a:p>
@@ -23208,7 +23960,7 @@
                 <a:latin typeface="Courier New" panose="02070309020205020404" pitchFamily="49" charset="0"/>
                 <a:cs typeface="Courier New" panose="02070309020205020404" pitchFamily="49" charset="0"/>
               </a:rPr>
-              <a:t>    {3'b100, 7'b0000000, R_OP} : CtrlAluOp = XOR; //XOR</a:t>
+              <a:t>    BGEU    : BranchCondMet = ~(RegRdData1&lt;RegRdData2)                    ;// BGEU</a:t>
             </a:r>
           </a:p>
           <a:p>
@@ -23217,7 +23969,7 @@
                 <a:latin typeface="Courier New" panose="02070309020205020404" pitchFamily="49" charset="0"/>
                 <a:cs typeface="Courier New" panose="02070309020205020404" pitchFamily="49" charset="0"/>
               </a:rPr>
-              <a:t>    {3'b101, 7'b0000000, R_OP} : CtrlAluOp = SRL; //SRL</a:t>
+              <a:t>    default : BranchCondMet = 1'b0                                ;</a:t>
             </a:r>
           </a:p>
           <a:p>
@@ -23226,7 +23978,7 @@
                 <a:latin typeface="Courier New" panose="02070309020205020404" pitchFamily="49" charset="0"/>
                 <a:cs typeface="Courier New" panose="02070309020205020404" pitchFamily="49" charset="0"/>
               </a:rPr>
-              <a:t>    {3'b101, 7'b0100000, R_OP} : CtrlAluOp = SRA; //SRA</a:t>
+              <a:t>  endcase</a:t>
             </a:r>
           </a:p>
           <a:p>
@@ -23235,16 +23987,57 @@
                 <a:latin typeface="Courier New" panose="02070309020205020404" pitchFamily="49" charset="0"/>
                 <a:cs typeface="Courier New" panose="02070309020205020404" pitchFamily="49" charset="0"/>
               </a:rPr>
-              <a:t>    {3'b110, 7'b0000000, R_OP} : CtrlAluOp = OR;  //OR</a:t>
-            </a:r>
-          </a:p>
+              <a:t>end</a:t>
+            </a:r>
+          </a:p>
+        </p:txBody>
+      </p:sp>
+      <p:sp>
+        <p:nvSpPr>
+          <p:cNvPr id="5" name="Rectangle 4">
+            <a:extLst>
+              <a:ext uri="{FF2B5EF4-FFF2-40B4-BE49-F238E27FC236}">
+                <a16:creationId xmlns:a16="http://schemas.microsoft.com/office/drawing/2014/main" id="{F08AAD3B-7801-4FA7-8EAA-641772676A3B}"/>
+              </a:ext>
+            </a:extLst>
+          </p:cNvPr>
+          <p:cNvSpPr/>
+          <p:nvPr/>
+        </p:nvSpPr>
+        <p:spPr>
+          <a:xfrm>
+            <a:off x="93045" y="1762862"/>
+            <a:ext cx="7959822" cy="1569660"/>
+          </a:xfrm>
+          <a:prstGeom prst="rect">
+            <a:avLst/>
+          </a:prstGeom>
+          <a:solidFill>
+            <a:schemeClr val="bg1">
+              <a:lumMod val="85000"/>
+              <a:lumOff val="15000"/>
+            </a:schemeClr>
+          </a:solidFill>
+          <a:ln>
+            <a:solidFill>
+              <a:schemeClr val="tx1">
+                <a:lumMod val="65000"/>
+              </a:schemeClr>
+            </a:solidFill>
+          </a:ln>
+        </p:spPr>
+        <p:txBody>
+          <a:bodyPr wrap="square">
+            <a:spAutoFit/>
+          </a:bodyPr>
+          <a:lstStyle/>
           <a:p>
             <a:r>
               <a:rPr lang="en-US" sz="1200" dirty="0">
                 <a:latin typeface="Courier New" panose="02070309020205020404" pitchFamily="49" charset="0"/>
                 <a:cs typeface="Courier New" panose="02070309020205020404" pitchFamily="49" charset="0"/>
               </a:rPr>
-              <a:t>    {3'b111, 7'b0000000, R_OP} : CtrlAluOp = AND; //AND</a:t>
+              <a:t> unique casez (Opcode)    //mux</a:t>
             </a:r>
           </a:p>
           <a:p>
@@ -23253,7 +24046,7 @@
                 <a:latin typeface="Courier New" panose="02070309020205020404" pitchFamily="49" charset="0"/>
                 <a:cs typeface="Courier New" panose="02070309020205020404" pitchFamily="49" charset="0"/>
               </a:rPr>
-              <a:t>    //-----I type-------</a:t>
+              <a:t>    JALR, I_OP, LOAD : SelImmType = I_TYPE;</a:t>
             </a:r>
           </a:p>
           <a:p>
@@ -23262,7 +24055,7 @@
                 <a:latin typeface="Courier New" panose="02070309020205020404" pitchFamily="49" charset="0"/>
                 <a:cs typeface="Courier New" panose="02070309020205020404" pitchFamily="49" charset="0"/>
               </a:rPr>
-              <a:t>    {3'b000, 7'b???????, I_OP} : CtrlAluOp = ADD; //ADDI</a:t>
+              <a:t>    LUI, AUIPC       : SelImmType = U_TYPE;</a:t>
             </a:r>
           </a:p>
           <a:p>
@@ -23271,7 +24064,7 @@
                 <a:latin typeface="Courier New" panose="02070309020205020404" pitchFamily="49" charset="0"/>
                 <a:cs typeface="Courier New" panose="02070309020205020404" pitchFamily="49" charset="0"/>
               </a:rPr>
-              <a:t>    {3'b010, 7'b???????, I_OP} : CtrlAluOp = SLT; //SLTI</a:t>
+              <a:t>    JAL              : SelImmType = J_TYPE;</a:t>
             </a:r>
           </a:p>
           <a:p>
@@ -23280,7 +24073,7 @@
                 <a:latin typeface="Courier New" panose="02070309020205020404" pitchFamily="49" charset="0"/>
                 <a:cs typeface="Courier New" panose="02070309020205020404" pitchFamily="49" charset="0"/>
               </a:rPr>
-              <a:t>    {3'b011, 7'b???????, I_OP} : CtrlAluOp = SLTU;//SLTUI</a:t>
+              <a:t>    BRANCH           : SelImmType = B_TYPE;</a:t>
             </a:r>
           </a:p>
           <a:p>
@@ -23289,7 +24082,7 @@
                 <a:latin typeface="Courier New" panose="02070309020205020404" pitchFamily="49" charset="0"/>
                 <a:cs typeface="Courier New" panose="02070309020205020404" pitchFamily="49" charset="0"/>
               </a:rPr>
-              <a:t>    {3'b100, 7'b???????, I_OP} : CtrlAluOp = XOR; //XORI</a:t>
+              <a:t>    STORE            : SelImmType = S_TYPE;</a:t>
             </a:r>
           </a:p>
           <a:p>
@@ -23298,7 +24091,7 @@
                 <a:latin typeface="Courier New" panose="02070309020205020404" pitchFamily="49" charset="0"/>
                 <a:cs typeface="Courier New" panose="02070309020205020404" pitchFamily="49" charset="0"/>
               </a:rPr>
-              <a:t>    {3'b110, 7'b???????, I_OP} : CtrlAluOp = OR;  //ORI</a:t>
+              <a:t>    default          : SelImmType = I_TYPE;</a:t>
             </a:r>
           </a:p>
           <a:p>
@@ -23307,70 +24100,7 @@
                 <a:latin typeface="Courier New" panose="02070309020205020404" pitchFamily="49" charset="0"/>
                 <a:cs typeface="Courier New" panose="02070309020205020404" pitchFamily="49" charset="0"/>
               </a:rPr>
-              <a:t>    {3'b111, 7'b???????, I_OP} : CtrlAluOp = AND; //ANDI</a:t>
-            </a:r>
-          </a:p>
-          <a:p>
-            <a:r>
-              <a:rPr lang="en-US" sz="1200" dirty="0">
-                <a:latin typeface="Courier New" panose="02070309020205020404" pitchFamily="49" charset="0"/>
-                <a:cs typeface="Courier New" panose="02070309020205020404" pitchFamily="49" charset="0"/>
-              </a:rPr>
-              <a:t>    {3'b001, 7'b0000000, I_OP} : CtrlAluOp = SLL; //SLLI</a:t>
-            </a:r>
-          </a:p>
-          <a:p>
-            <a:r>
-              <a:rPr lang="en-US" sz="1200" dirty="0">
-                <a:latin typeface="Courier New" panose="02070309020205020404" pitchFamily="49" charset="0"/>
-                <a:cs typeface="Courier New" panose="02070309020205020404" pitchFamily="49" charset="0"/>
-              </a:rPr>
-              <a:t>    {3'b101, 7'b0000000, I_OP} : CtrlAluOp = SRL; //SRLI</a:t>
-            </a:r>
-          </a:p>
-          <a:p>
-            <a:r>
-              <a:rPr lang="en-US" sz="1200" dirty="0">
-                <a:latin typeface="Courier New" panose="02070309020205020404" pitchFamily="49" charset="0"/>
-                <a:cs typeface="Courier New" panose="02070309020205020404" pitchFamily="49" charset="0"/>
-              </a:rPr>
-              <a:t>    {3'b101, 7'b0100000, I_OP} : CtrlAluOp = SRA; //SRAI</a:t>
-            </a:r>
-          </a:p>
-          <a:p>
-            <a:r>
-              <a:rPr lang="en-US" sz="1200" dirty="0">
-                <a:latin typeface="Courier New" panose="02070309020205020404" pitchFamily="49" charset="0"/>
-                <a:cs typeface="Courier New" panose="02070309020205020404" pitchFamily="49" charset="0"/>
-              </a:rPr>
-              <a:t>    //-----Other-------</a:t>
-            </a:r>
-          </a:p>
-          <a:p>
-            <a:r>
-              <a:rPr lang="en-US" sz="1200" dirty="0">
-                <a:latin typeface="Courier New" panose="02070309020205020404" pitchFamily="49" charset="0"/>
-                <a:cs typeface="Courier New" panose="02070309020205020404" pitchFamily="49" charset="0"/>
-              </a:rPr>
-              <a:t>    default                    : CtrlAluOp = ADD; //LUI || AUIPC || JAL || JALR || BRANCH || LOAD || STORE</a:t>
-            </a:r>
-          </a:p>
-          <a:p>
-            <a:r>
-              <a:rPr lang="en-US" sz="1200" dirty="0">
-                <a:latin typeface="Courier New" panose="02070309020205020404" pitchFamily="49" charset="0"/>
-                <a:cs typeface="Courier New" panose="02070309020205020404" pitchFamily="49" charset="0"/>
-              </a:rPr>
-              <a:t>    endcase</a:t>
-            </a:r>
-          </a:p>
-          <a:p>
-            <a:r>
-              <a:rPr lang="en-US" sz="1200" dirty="0">
-                <a:latin typeface="Courier New" panose="02070309020205020404" pitchFamily="49" charset="0"/>
-                <a:cs typeface="Courier New" panose="02070309020205020404" pitchFamily="49" charset="0"/>
-              </a:rPr>
-              <a:t>end</a:t>
+              <a:t>  endcase</a:t>
             </a:r>
           </a:p>
         </p:txBody>
@@ -23378,7 +24108,7 @@
     </p:spTree>
     <p:extLst>
       <p:ext uri="{BB962C8B-B14F-4D97-AF65-F5344CB8AC3E}">
-        <p14:creationId xmlns:p14="http://schemas.microsoft.com/office/powerpoint/2010/main" val="1780271469"/>
+        <p14:creationId xmlns:p14="http://schemas.microsoft.com/office/powerpoint/2010/main" val="3383740315"/>
       </p:ext>
     </p:extLst>
   </p:cSld>
@@ -23448,6 +24178,356 @@
         </p:nvSpPr>
         <p:spPr>
           <a:xfrm>
+            <a:off x="262954" y="1375207"/>
+            <a:ext cx="10141228" cy="5262979"/>
+          </a:xfrm>
+          <a:prstGeom prst="rect">
+            <a:avLst/>
+          </a:prstGeom>
+          <a:solidFill>
+            <a:schemeClr val="bg1">
+              <a:lumMod val="85000"/>
+              <a:lumOff val="15000"/>
+            </a:schemeClr>
+          </a:solidFill>
+          <a:ln>
+            <a:solidFill>
+              <a:schemeClr val="tx1">
+                <a:lumMod val="65000"/>
+              </a:schemeClr>
+            </a:solidFill>
+          </a:ln>
+        </p:spPr>
+        <p:txBody>
+          <a:bodyPr wrap="square">
+            <a:spAutoFit/>
+          </a:bodyPr>
+          <a:lstStyle/>
+          <a:p>
+            <a:r>
+              <a:rPr lang="en-US" sz="1200" dirty="0" err="1">
+                <a:latin typeface="Courier New" panose="02070309020205020404" pitchFamily="49" charset="0"/>
+                <a:cs typeface="Courier New" panose="02070309020205020404" pitchFamily="49" charset="0"/>
+              </a:rPr>
+              <a:t>always_comb</a:t>
+            </a:r>
+            <a:r>
+              <a:rPr lang="en-US" sz="1200" dirty="0">
+                <a:latin typeface="Courier New" panose="02070309020205020404" pitchFamily="49" charset="0"/>
+                <a:cs typeface="Courier New" panose="02070309020205020404" pitchFamily="49" charset="0"/>
+              </a:rPr>
+              <a:t> begin</a:t>
+            </a:r>
+          </a:p>
+          <a:p>
+            <a:r>
+              <a:rPr lang="en-US" sz="1200" dirty="0">
+                <a:latin typeface="Courier New" panose="02070309020205020404" pitchFamily="49" charset="0"/>
+                <a:cs typeface="Courier New" panose="02070309020205020404" pitchFamily="49" charset="0"/>
+              </a:rPr>
+              <a:t>    unique casez ({Funct3, Funct7, Opcode})</a:t>
+            </a:r>
+          </a:p>
+          <a:p>
+            <a:r>
+              <a:rPr lang="en-US" sz="1200" dirty="0">
+                <a:latin typeface="Courier New" panose="02070309020205020404" pitchFamily="49" charset="0"/>
+                <a:cs typeface="Courier New" panose="02070309020205020404" pitchFamily="49" charset="0"/>
+              </a:rPr>
+              <a:t>    //-----R type-------</a:t>
+            </a:r>
+          </a:p>
+          <a:p>
+            <a:r>
+              <a:rPr lang="en-US" sz="1200" dirty="0">
+                <a:latin typeface="Courier New" panose="02070309020205020404" pitchFamily="49" charset="0"/>
+                <a:cs typeface="Courier New" panose="02070309020205020404" pitchFamily="49" charset="0"/>
+              </a:rPr>
+              <a:t>    {3'b000, 7'b0000000, R_OP} : CtrlAluOp = ADD; //ADD</a:t>
+            </a:r>
+          </a:p>
+          <a:p>
+            <a:r>
+              <a:rPr lang="en-US" sz="1200" dirty="0">
+                <a:latin typeface="Courier New" panose="02070309020205020404" pitchFamily="49" charset="0"/>
+                <a:cs typeface="Courier New" panose="02070309020205020404" pitchFamily="49" charset="0"/>
+              </a:rPr>
+              <a:t>    {3'b000, 7'b0100000, R_OP} : CtrlAluOp = SUB; //SUB</a:t>
+            </a:r>
+          </a:p>
+          <a:p>
+            <a:r>
+              <a:rPr lang="en-US" sz="1200" dirty="0">
+                <a:latin typeface="Courier New" panose="02070309020205020404" pitchFamily="49" charset="0"/>
+                <a:cs typeface="Courier New" panose="02070309020205020404" pitchFamily="49" charset="0"/>
+              </a:rPr>
+              <a:t>    {3'b001, 7'b0000000, R_OP} : CtrlAluOp = SLL; //SLL</a:t>
+            </a:r>
+          </a:p>
+          <a:p>
+            <a:r>
+              <a:rPr lang="en-US" sz="1200" dirty="0">
+                <a:latin typeface="Courier New" panose="02070309020205020404" pitchFamily="49" charset="0"/>
+                <a:cs typeface="Courier New" panose="02070309020205020404" pitchFamily="49" charset="0"/>
+              </a:rPr>
+              <a:t>    {3'b010, 7'b0000000, R_OP} : CtrlAluOp = SLT; //SLT</a:t>
+            </a:r>
+          </a:p>
+          <a:p>
+            <a:r>
+              <a:rPr lang="en-US" sz="1200" dirty="0">
+                <a:latin typeface="Courier New" panose="02070309020205020404" pitchFamily="49" charset="0"/>
+                <a:cs typeface="Courier New" panose="02070309020205020404" pitchFamily="49" charset="0"/>
+              </a:rPr>
+              <a:t>    {3'b011, 7'b0000000, R_OP} : CtrlAluOp = SLTU;//SLTU</a:t>
+            </a:r>
+          </a:p>
+          <a:p>
+            <a:r>
+              <a:rPr lang="en-US" sz="1200" dirty="0">
+                <a:latin typeface="Courier New" panose="02070309020205020404" pitchFamily="49" charset="0"/>
+                <a:cs typeface="Courier New" panose="02070309020205020404" pitchFamily="49" charset="0"/>
+              </a:rPr>
+              <a:t>    {3'b100, 7'b0000000, R_OP} : CtrlAluOp = XOR; //XOR</a:t>
+            </a:r>
+          </a:p>
+          <a:p>
+            <a:r>
+              <a:rPr lang="en-US" sz="1200" dirty="0">
+                <a:latin typeface="Courier New" panose="02070309020205020404" pitchFamily="49" charset="0"/>
+                <a:cs typeface="Courier New" panose="02070309020205020404" pitchFamily="49" charset="0"/>
+              </a:rPr>
+              <a:t>    {3'b101, 7'b0000000, R_OP} : CtrlAluOp = SRL; //SRL</a:t>
+            </a:r>
+          </a:p>
+          <a:p>
+            <a:r>
+              <a:rPr lang="en-US" sz="1200" dirty="0">
+                <a:latin typeface="Courier New" panose="02070309020205020404" pitchFamily="49" charset="0"/>
+                <a:cs typeface="Courier New" panose="02070309020205020404" pitchFamily="49" charset="0"/>
+              </a:rPr>
+              <a:t>    {3'b101, 7'b0100000, R_OP} : CtrlAluOp = SRA; //SRA</a:t>
+            </a:r>
+          </a:p>
+          <a:p>
+            <a:r>
+              <a:rPr lang="en-US" sz="1200" dirty="0">
+                <a:latin typeface="Courier New" panose="02070309020205020404" pitchFamily="49" charset="0"/>
+                <a:cs typeface="Courier New" panose="02070309020205020404" pitchFamily="49" charset="0"/>
+              </a:rPr>
+              <a:t>    {3'b110, 7'b0000000, R_OP} : CtrlAluOp = OR;  //OR</a:t>
+            </a:r>
+          </a:p>
+          <a:p>
+            <a:r>
+              <a:rPr lang="en-US" sz="1200" dirty="0">
+                <a:latin typeface="Courier New" panose="02070309020205020404" pitchFamily="49" charset="0"/>
+                <a:cs typeface="Courier New" panose="02070309020205020404" pitchFamily="49" charset="0"/>
+              </a:rPr>
+              <a:t>    {3'b111, 7'b0000000, R_OP} : CtrlAluOp = AND; //AND</a:t>
+            </a:r>
+          </a:p>
+          <a:p>
+            <a:r>
+              <a:rPr lang="en-US" sz="1200" dirty="0">
+                <a:latin typeface="Courier New" panose="02070309020205020404" pitchFamily="49" charset="0"/>
+                <a:cs typeface="Courier New" panose="02070309020205020404" pitchFamily="49" charset="0"/>
+              </a:rPr>
+              <a:t>    //-----I type-------</a:t>
+            </a:r>
+          </a:p>
+          <a:p>
+            <a:r>
+              <a:rPr lang="en-US" sz="1200" dirty="0">
+                <a:latin typeface="Courier New" panose="02070309020205020404" pitchFamily="49" charset="0"/>
+                <a:cs typeface="Courier New" panose="02070309020205020404" pitchFamily="49" charset="0"/>
+              </a:rPr>
+              <a:t>    {3'b000, 7'b???????, I_OP} : CtrlAluOp = ADD; //ADDI</a:t>
+            </a:r>
+          </a:p>
+          <a:p>
+            <a:r>
+              <a:rPr lang="en-US" sz="1200" dirty="0">
+                <a:latin typeface="Courier New" panose="02070309020205020404" pitchFamily="49" charset="0"/>
+                <a:cs typeface="Courier New" panose="02070309020205020404" pitchFamily="49" charset="0"/>
+              </a:rPr>
+              <a:t>    {3'b010, 7'b???????, I_OP} : CtrlAluOp = SLT; //SLTI</a:t>
+            </a:r>
+          </a:p>
+          <a:p>
+            <a:r>
+              <a:rPr lang="en-US" sz="1200" dirty="0">
+                <a:latin typeface="Courier New" panose="02070309020205020404" pitchFamily="49" charset="0"/>
+                <a:cs typeface="Courier New" panose="02070309020205020404" pitchFamily="49" charset="0"/>
+              </a:rPr>
+              <a:t>    {3'b011, 7'b???????, I_OP} : CtrlAluOp = SLTU;//SLTUI</a:t>
+            </a:r>
+          </a:p>
+          <a:p>
+            <a:r>
+              <a:rPr lang="en-US" sz="1200" dirty="0">
+                <a:latin typeface="Courier New" panose="02070309020205020404" pitchFamily="49" charset="0"/>
+                <a:cs typeface="Courier New" panose="02070309020205020404" pitchFamily="49" charset="0"/>
+              </a:rPr>
+              <a:t>    {3'b100, 7'b???????, I_OP} : CtrlAluOp = XOR; //XORI</a:t>
+            </a:r>
+          </a:p>
+          <a:p>
+            <a:r>
+              <a:rPr lang="en-US" sz="1200" dirty="0">
+                <a:latin typeface="Courier New" panose="02070309020205020404" pitchFamily="49" charset="0"/>
+                <a:cs typeface="Courier New" panose="02070309020205020404" pitchFamily="49" charset="0"/>
+              </a:rPr>
+              <a:t>    {3'b110, 7'b???????, I_OP} : CtrlAluOp = OR;  //ORI</a:t>
+            </a:r>
+          </a:p>
+          <a:p>
+            <a:r>
+              <a:rPr lang="en-US" sz="1200" dirty="0">
+                <a:latin typeface="Courier New" panose="02070309020205020404" pitchFamily="49" charset="0"/>
+                <a:cs typeface="Courier New" panose="02070309020205020404" pitchFamily="49" charset="0"/>
+              </a:rPr>
+              <a:t>    {3'b111, 7'b???????, I_OP} : CtrlAluOp = AND; //ANDI</a:t>
+            </a:r>
+          </a:p>
+          <a:p>
+            <a:r>
+              <a:rPr lang="en-US" sz="1200" dirty="0">
+                <a:latin typeface="Courier New" panose="02070309020205020404" pitchFamily="49" charset="0"/>
+                <a:cs typeface="Courier New" panose="02070309020205020404" pitchFamily="49" charset="0"/>
+              </a:rPr>
+              <a:t>    {3'b001, 7'b0000000, I_OP} : CtrlAluOp = SLL; //SLLI</a:t>
+            </a:r>
+          </a:p>
+          <a:p>
+            <a:r>
+              <a:rPr lang="en-US" sz="1200" dirty="0">
+                <a:latin typeface="Courier New" panose="02070309020205020404" pitchFamily="49" charset="0"/>
+                <a:cs typeface="Courier New" panose="02070309020205020404" pitchFamily="49" charset="0"/>
+              </a:rPr>
+              <a:t>    {3'b101, 7'b0000000, I_OP} : CtrlAluOp = SRL; //SRLI</a:t>
+            </a:r>
+          </a:p>
+          <a:p>
+            <a:r>
+              <a:rPr lang="en-US" sz="1200" dirty="0">
+                <a:latin typeface="Courier New" panose="02070309020205020404" pitchFamily="49" charset="0"/>
+                <a:cs typeface="Courier New" panose="02070309020205020404" pitchFamily="49" charset="0"/>
+              </a:rPr>
+              <a:t>    {3'b101, 7'b0100000, I_OP} : CtrlAluOp = SRA; //SRAI</a:t>
+            </a:r>
+          </a:p>
+          <a:p>
+            <a:r>
+              <a:rPr lang="en-US" sz="1200" dirty="0">
+                <a:latin typeface="Courier New" panose="02070309020205020404" pitchFamily="49" charset="0"/>
+                <a:cs typeface="Courier New" panose="02070309020205020404" pitchFamily="49" charset="0"/>
+              </a:rPr>
+              <a:t>    //-----Other-------</a:t>
+            </a:r>
+          </a:p>
+          <a:p>
+            <a:r>
+              <a:rPr lang="en-US" sz="1200" dirty="0">
+                <a:latin typeface="Courier New" panose="02070309020205020404" pitchFamily="49" charset="0"/>
+                <a:cs typeface="Courier New" panose="02070309020205020404" pitchFamily="49" charset="0"/>
+              </a:rPr>
+              <a:t>    default                    : CtrlAluOp = ADD; //LUI || AUIPC || JAL || JALR || BRANCH || LOAD || STORE</a:t>
+            </a:r>
+          </a:p>
+          <a:p>
+            <a:r>
+              <a:rPr lang="en-US" sz="1200" dirty="0">
+                <a:latin typeface="Courier New" panose="02070309020205020404" pitchFamily="49" charset="0"/>
+                <a:cs typeface="Courier New" panose="02070309020205020404" pitchFamily="49" charset="0"/>
+              </a:rPr>
+              <a:t>    endcase</a:t>
+            </a:r>
+          </a:p>
+          <a:p>
+            <a:r>
+              <a:rPr lang="en-US" sz="1200" dirty="0">
+                <a:latin typeface="Courier New" panose="02070309020205020404" pitchFamily="49" charset="0"/>
+                <a:cs typeface="Courier New" panose="02070309020205020404" pitchFamily="49" charset="0"/>
+              </a:rPr>
+              <a:t>end</a:t>
+            </a:r>
+          </a:p>
+        </p:txBody>
+      </p:sp>
+    </p:spTree>
+    <p:extLst>
+      <p:ext uri="{BB962C8B-B14F-4D97-AF65-F5344CB8AC3E}">
+        <p14:creationId xmlns:p14="http://schemas.microsoft.com/office/powerpoint/2010/main" val="1780271469"/>
+      </p:ext>
+    </p:extLst>
+  </p:cSld>
+  <p:clrMapOvr>
+    <a:masterClrMapping/>
+  </p:clrMapOvr>
+</p:sld>
+</file>
+
+<file path=ppt/slides/slide37.xml><?xml version="1.0" encoding="utf-8"?>
+<p:sld xmlns:a="http://schemas.openxmlformats.org/drawingml/2006/main" xmlns:r="http://schemas.openxmlformats.org/officeDocument/2006/relationships" xmlns:p="http://schemas.openxmlformats.org/presentationml/2006/main">
+  <p:cSld>
+    <p:spTree>
+      <p:nvGrpSpPr>
+        <p:cNvPr id="1" name=""/>
+        <p:cNvGrpSpPr/>
+        <p:nvPr/>
+      </p:nvGrpSpPr>
+      <p:grpSpPr>
+        <a:xfrm>
+          <a:off x="0" y="0"/>
+          <a:ext cx="0" cy="0"/>
+          <a:chOff x="0" y="0"/>
+          <a:chExt cx="0" cy="0"/>
+        </a:xfrm>
+      </p:grpSpPr>
+      <p:sp>
+        <p:nvSpPr>
+          <p:cNvPr id="2" name="Title 1">
+            <a:extLst>
+              <a:ext uri="{FF2B5EF4-FFF2-40B4-BE49-F238E27FC236}">
+                <a16:creationId xmlns:a16="http://schemas.microsoft.com/office/drawing/2014/main" id="{43953E14-D2C8-4372-9D39-C41D5B2F918F}"/>
+              </a:ext>
+            </a:extLst>
+          </p:cNvPr>
+          <p:cNvSpPr>
+            <a:spLocks noGrp="1"/>
+          </p:cNvSpPr>
+          <p:nvPr>
+            <p:ph type="title"/>
+          </p:nvPr>
+        </p:nvSpPr>
+        <p:spPr/>
+        <p:txBody>
+          <a:bodyPr/>
+          <a:lstStyle/>
+          <a:p>
+            <a:r>
+              <a:rPr lang="en-US" dirty="0"/>
+              <a:t>Backup</a:t>
+            </a:r>
+            <a:endParaRPr lang="en-IL" dirty="0"/>
+          </a:p>
+        </p:txBody>
+      </p:sp>
+      <p:sp>
+        <p:nvSpPr>
+          <p:cNvPr id="7" name="Rectangle 6">
+            <a:extLst>
+              <a:ext uri="{FF2B5EF4-FFF2-40B4-BE49-F238E27FC236}">
+                <a16:creationId xmlns:a16="http://schemas.microsoft.com/office/drawing/2014/main" id="{7C2EE6B6-A272-4FC9-896D-147A2E5F165C}"/>
+              </a:ext>
+            </a:extLst>
+          </p:cNvPr>
+          <p:cNvSpPr/>
+          <p:nvPr/>
+        </p:nvSpPr>
+        <p:spPr>
+          <a:xfrm>
             <a:off x="131477" y="2302307"/>
             <a:ext cx="11929046" cy="3231654"/>
           </a:xfrm>
@@ -23538,7 +24618,7 @@
                 <a:latin typeface="Courier New" panose="02070309020205020404" pitchFamily="49" charset="0"/>
                 <a:cs typeface="Courier New" panose="02070309020205020404" pitchFamily="49" charset="0"/>
               </a:rPr>
-              <a:t>assign SelAluPc         = (Opcode == JAL) || (Opcode == JALR) || (Opcode == BRANCH) || (Opcode == AUIPC);</a:t>
+              <a:t>assign SelAluPc         = (Opcode == JAL) || (Opcode == BRANCH) || (Opcode == AUIPC);</a:t>
             </a:r>
           </a:p>
           <a:p>

</xml_diff>